<commit_message>
- Improved logging for keyword detection - Added prediction output in the Arduino code - Updates to PowerPoint presentation
</commit_message>
<xml_diff>
--- a/UpadhyayaN-Presentation.pptx
+++ b/UpadhyayaN-Presentation.pptx
@@ -117,6 +117,11 @@
       </a:defRPr>
     </a:lvl9pPr>
   </p:defaultTextStyle>
+  <p:extLst>
+    <p:ext uri="{EFAFB233-063F-42B5-8137-9DF3F51BA10A}">
+      <p15:sldGuideLst xmlns:p15="http://schemas.microsoft.com/office/powerpoint/2012/main"/>
+    </p:ext>
+  </p:extLst>
 </p:presentation>
 </file>
 
@@ -7116,43 +7121,7 @@
         </a:p>
       </dgm:t>
     </dgm:pt>
-    <dgm:pt modelId="{B06117A6-1B5C-4D8D-8533-B8D00A041C68}">
-      <dgm:prSet/>
-      <dgm:spPr/>
-      <dgm:t>
-        <a:bodyPr/>
-        <a:lstStyle/>
-        <a:p>
-          <a:r>
-            <a:rPr lang="en-US"/>
-            <a:t>Power Button</a:t>
-          </a:r>
-        </a:p>
-      </dgm:t>
-    </dgm:pt>
-    <dgm:pt modelId="{EDE951CB-434E-4E1E-BAFD-BA6D0BACB736}" type="parTrans" cxnId="{40DF98C3-4608-4601-841D-47B8C4443948}">
-      <dgm:prSet/>
-      <dgm:spPr/>
-      <dgm:t>
-        <a:bodyPr/>
-        <a:lstStyle/>
-        <a:p>
-          <a:endParaRPr lang="en-US"/>
-        </a:p>
-      </dgm:t>
-    </dgm:pt>
-    <dgm:pt modelId="{86E26155-0B4A-4EE5-A585-DE1E9A7265A5}" type="sibTrans" cxnId="{40DF98C3-4608-4601-841D-47B8C4443948}">
-      <dgm:prSet/>
-      <dgm:spPr/>
-      <dgm:t>
-        <a:bodyPr/>
-        <a:lstStyle/>
-        <a:p>
-          <a:endParaRPr lang="en-US"/>
-        </a:p>
-      </dgm:t>
-    </dgm:pt>
-    <dgm:pt modelId="{B6E85E2C-2FC4-4DD4-8AE2-131240566A24}">
+    <dgm:pt modelId="{9AE6FF14-901C-4839-B02C-3A5E455297CF}">
       <dgm:prSet/>
       <dgm:spPr/>
       <dgm:t>
@@ -7161,42 +7130,6 @@
         <a:p>
           <a:r>
             <a:rPr lang="en-US" dirty="0"/>
-            <a:t>Fingerprint Scanner</a:t>
-          </a:r>
-        </a:p>
-      </dgm:t>
-    </dgm:pt>
-    <dgm:pt modelId="{E637AB7B-0437-4478-A46F-130157F02887}" type="parTrans" cxnId="{0794CA49-7099-4850-84BF-FA69F3855FA4}">
-      <dgm:prSet/>
-      <dgm:spPr/>
-      <dgm:t>
-        <a:bodyPr/>
-        <a:lstStyle/>
-        <a:p>
-          <a:endParaRPr lang="en-US"/>
-        </a:p>
-      </dgm:t>
-    </dgm:pt>
-    <dgm:pt modelId="{F2DECB6C-5CEC-4FE7-9DEB-FF4FAEE6FA34}" type="sibTrans" cxnId="{0794CA49-7099-4850-84BF-FA69F3855FA4}">
-      <dgm:prSet/>
-      <dgm:spPr/>
-      <dgm:t>
-        <a:bodyPr/>
-        <a:lstStyle/>
-        <a:p>
-          <a:endParaRPr lang="en-US"/>
-        </a:p>
-      </dgm:t>
-    </dgm:pt>
-    <dgm:pt modelId="{9AE6FF14-901C-4839-B02C-3A5E455297CF}">
-      <dgm:prSet/>
-      <dgm:spPr/>
-      <dgm:t>
-        <a:bodyPr/>
-        <a:lstStyle/>
-        <a:p>
-          <a:r>
-            <a:rPr lang="en-US"/>
             <a:t>Apple HomeKit</a:t>
           </a:r>
         </a:p>
@@ -7286,6 +7219,78 @@
       </dgm:t>
     </dgm:pt>
     <dgm:pt modelId="{DED6F00C-4A99-9240-A90A-8CCE49D68AF8}" type="sibTrans" cxnId="{8B44F8EF-EE88-7E4A-9807-75401E3890CE}">
+      <dgm:prSet/>
+      <dgm:spPr/>
+      <dgm:t>
+        <a:bodyPr/>
+        <a:lstStyle/>
+        <a:p>
+          <a:endParaRPr lang="en-US"/>
+        </a:p>
+      </dgm:t>
+    </dgm:pt>
+    <dgm:pt modelId="{D4A327E6-6A0E-124B-A1E0-AAD3314FE86E}">
+      <dgm:prSet/>
+      <dgm:spPr/>
+      <dgm:t>
+        <a:bodyPr/>
+        <a:lstStyle/>
+        <a:p>
+          <a:r>
+            <a:rPr lang="en-US" dirty="0"/>
+            <a:t>Fingerprint Scanner</a:t>
+          </a:r>
+        </a:p>
+      </dgm:t>
+    </dgm:pt>
+    <dgm:pt modelId="{1072ADBB-B16E-E644-8F6D-E96C890FCEEE}" type="parTrans" cxnId="{4BB1011D-501F-9040-846A-E2435785522F}">
+      <dgm:prSet/>
+      <dgm:spPr/>
+      <dgm:t>
+        <a:bodyPr/>
+        <a:lstStyle/>
+        <a:p>
+          <a:endParaRPr lang="en-US"/>
+        </a:p>
+      </dgm:t>
+    </dgm:pt>
+    <dgm:pt modelId="{CAE1A28D-1491-B842-94B4-5E06E9BC4203}" type="sibTrans" cxnId="{4BB1011D-501F-9040-846A-E2435785522F}">
+      <dgm:prSet/>
+      <dgm:spPr/>
+      <dgm:t>
+        <a:bodyPr/>
+        <a:lstStyle/>
+        <a:p>
+          <a:endParaRPr lang="en-US"/>
+        </a:p>
+      </dgm:t>
+    </dgm:pt>
+    <dgm:pt modelId="{2DBBDD1D-CFC4-004B-A394-DCB0F310B313}">
+      <dgm:prSet/>
+      <dgm:spPr/>
+      <dgm:t>
+        <a:bodyPr/>
+        <a:lstStyle/>
+        <a:p>
+          <a:r>
+            <a:rPr lang="en-US" dirty="0"/>
+            <a:t>Text Message</a:t>
+          </a:r>
+        </a:p>
+      </dgm:t>
+    </dgm:pt>
+    <dgm:pt modelId="{67EC14A6-745B-B941-882B-15AA54D6A276}" type="parTrans" cxnId="{BE4B5A12-9053-7C4D-AF57-4D179F76EE82}">
+      <dgm:prSet/>
+      <dgm:spPr/>
+      <dgm:t>
+        <a:bodyPr/>
+        <a:lstStyle/>
+        <a:p>
+          <a:endParaRPr lang="en-US"/>
+        </a:p>
+      </dgm:t>
+    </dgm:pt>
+    <dgm:pt modelId="{60B19EAE-6043-6440-8620-01847B90257D}" type="sibTrans" cxnId="{BE4B5A12-9053-7C4D-AF57-4D179F76EE82}">
       <dgm:prSet/>
       <dgm:spPr/>
       <dgm:t>
@@ -7408,41 +7413,41 @@
     </dgm:pt>
   </dgm:ptLst>
   <dgm:cxnLst>
-    <dgm:cxn modelId="{A1C5A107-6C3B-CB4E-AC25-FDA389207872}" type="presOf" srcId="{99973F07-28EE-124F-97FE-72A74B79C316}" destId="{9D8B4256-6149-A642-99E7-ED05F6BAC742}" srcOrd="0" destOrd="1" presId="urn:microsoft.com/office/officeart/2005/8/layout/chevron1"/>
+    <dgm:cxn modelId="{A1C5A107-6C3B-CB4E-AC25-FDA389207872}" type="presOf" srcId="{99973F07-28EE-124F-97FE-72A74B79C316}" destId="{9D8B4256-6149-A642-99E7-ED05F6BAC742}" srcOrd="0" destOrd="2" presId="urn:microsoft.com/office/officeart/2005/8/layout/chevron1"/>
     <dgm:cxn modelId="{0345120A-461D-BB4F-ADB0-F32D35DB1015}" type="presOf" srcId="{2AAB40B2-796D-4DC4-94E4-4A1550F1C571}" destId="{EFB97F1A-EDB0-7940-B723-E024019E48AF}" srcOrd="0" destOrd="0" presId="urn:microsoft.com/office/officeart/2005/8/layout/chevron1"/>
     <dgm:cxn modelId="{F65E2B10-FDD1-FF49-8B38-6AB1A87573B4}" type="presOf" srcId="{6EF68EA5-A2B6-4CDF-B789-4DD2DF0ADB18}" destId="{9D8B4256-6149-A642-99E7-ED05F6BAC742}" srcOrd="0" destOrd="0" presId="urn:microsoft.com/office/officeart/2005/8/layout/chevron1"/>
+    <dgm:cxn modelId="{BE4B5A12-9053-7C4D-AF57-4D179F76EE82}" srcId="{E3EFC1BD-6E85-4BDB-83AD-D0AB00B0EDA4}" destId="{2DBBDD1D-CFC4-004B-A394-DCB0F310B313}" srcOrd="5" destOrd="0" parTransId="{67EC14A6-745B-B941-882B-15AA54D6A276}" sibTransId="{60B19EAE-6043-6440-8620-01847B90257D}"/>
+    <dgm:cxn modelId="{6090AD15-17A3-E949-8114-27B309092859}" type="presOf" srcId="{D4A327E6-6A0E-124B-A1E0-AAD3314FE86E}" destId="{9D8B4256-6149-A642-99E7-ED05F6BAC742}" srcOrd="0" destOrd="1" presId="urn:microsoft.com/office/officeart/2005/8/layout/chevron1"/>
     <dgm:cxn modelId="{F013EC19-9EE6-424E-BA14-17D68A2E35A1}" srcId="{729966C0-85EB-400A-98F7-79343C8C6ACD}" destId="{E3EFC1BD-6E85-4BDB-83AD-D0AB00B0EDA4}" srcOrd="3" destOrd="0" parTransId="{B0B5A146-16AA-47D0-88DB-EA055FA4C85F}" sibTransId="{16496AD0-964D-421F-A179-9688B5440BAF}"/>
+    <dgm:cxn modelId="{4BB1011D-501F-9040-846A-E2435785522F}" srcId="{E3EFC1BD-6E85-4BDB-83AD-D0AB00B0EDA4}" destId="{D4A327E6-6A0E-124B-A1E0-AAD3314FE86E}" srcOrd="1" destOrd="0" parTransId="{1072ADBB-B16E-E644-8F6D-E96C890FCEEE}" sibTransId="{CAE1A28D-1491-B842-94B4-5E06E9BC4203}"/>
     <dgm:cxn modelId="{69F26E21-E736-4893-A9B4-F1582EF3D584}" srcId="{D8A7F02F-C383-440F-BBB4-261B35C34AD2}" destId="{37241F5E-FCE8-4AB9-AEC6-EB530BE97F5D}" srcOrd="0" destOrd="0" parTransId="{1375E408-4A11-4B94-BC41-B6F0D23A834A}" sibTransId="{445B20D9-D3A7-444B-A58F-A331D1FE2F18}"/>
     <dgm:cxn modelId="{1E72AA36-A1E2-FB4B-8CDE-E1B145D6D276}" type="presOf" srcId="{9AE6FF14-901C-4839-B02C-3A5E455297CF}" destId="{9D8B4256-6149-A642-99E7-ED05F6BAC742}" srcOrd="0" destOrd="6" presId="urn:microsoft.com/office/officeart/2005/8/layout/chevron1"/>
-    <dgm:cxn modelId="{0794CA49-7099-4850-84BF-FA69F3855FA4}" srcId="{E3EFC1BD-6E85-4BDB-83AD-D0AB00B0EDA4}" destId="{B6E85E2C-2FC4-4DD4-8AE2-131240566A24}" srcOrd="5" destOrd="0" parTransId="{E637AB7B-0437-4478-A46F-130157F02887}" sibTransId="{F2DECB6C-5CEC-4FE7-9DEB-FF4FAEE6FA34}"/>
     <dgm:cxn modelId="{6126394E-56DC-454E-9C4C-DA065E301A4E}" type="presOf" srcId="{7385691A-AC27-45CB-8BC0-4C14C3B4D268}" destId="{125D5E84-C581-DF4A-A1A2-9CD54E196800}" srcOrd="0" destOrd="0" presId="urn:microsoft.com/office/officeart/2005/8/layout/chevron1"/>
     <dgm:cxn modelId="{4EC5D952-564A-4E59-8990-6B545D37DECD}" srcId="{7385691A-AC27-45CB-8BC0-4C14C3B4D268}" destId="{2A73C962-8F0A-480D-B11A-5B25743FD7E7}" srcOrd="2" destOrd="0" parTransId="{A4EAA3F6-84FA-4E9F-BF28-C27B8F79C707}" sibTransId="{3A3A0694-57D6-4327-A7E7-E4F65B4C3849}"/>
     <dgm:cxn modelId="{269CF25A-2B74-8B40-BEDD-4198B69D9B18}" type="presOf" srcId="{5EA71323-4AA7-4D2D-95F8-8D1DC76ABDDE}" destId="{13E4EB7F-9949-2048-8FDE-5F044882C5F4}" srcOrd="0" destOrd="0" presId="urn:microsoft.com/office/officeart/2005/8/layout/chevron1"/>
-    <dgm:cxn modelId="{6FAA515B-8287-B942-BF10-951BF28DA90B}" srcId="{E3EFC1BD-6E85-4BDB-83AD-D0AB00B0EDA4}" destId="{99973F07-28EE-124F-97FE-72A74B79C316}" srcOrd="1" destOrd="0" parTransId="{1958D2A1-61D5-2F4E-9CAA-8994F888D73C}" sibTransId="{022A5ED0-3527-484A-9FE1-37FC1791D6AB}"/>
+    <dgm:cxn modelId="{6FAA515B-8287-B942-BF10-951BF28DA90B}" srcId="{E3EFC1BD-6E85-4BDB-83AD-D0AB00B0EDA4}" destId="{99973F07-28EE-124F-97FE-72A74B79C316}" srcOrd="2" destOrd="0" parTransId="{1958D2A1-61D5-2F4E-9CAA-8994F888D73C}" sibTransId="{022A5ED0-3527-484A-9FE1-37FC1791D6AB}"/>
     <dgm:cxn modelId="{631D135E-C215-334E-A246-336F6646EF53}" type="presOf" srcId="{729966C0-85EB-400A-98F7-79343C8C6ACD}" destId="{D6EE7385-5CC8-6F4E-83E4-60517F7A88E7}" srcOrd="0" destOrd="0" presId="urn:microsoft.com/office/officeart/2005/8/layout/chevron1"/>
     <dgm:cxn modelId="{1F0BA661-228A-4FBE-BCDB-511A783DCE6D}" srcId="{E3EFC1BD-6E85-4BDB-83AD-D0AB00B0EDA4}" destId="{9AE6FF14-901C-4839-B02C-3A5E455297CF}" srcOrd="6" destOrd="0" parTransId="{DE3ABC13-32DA-47DD-91B0-70D8390DC387}" sibTransId="{992F1B52-2AB9-4816-B950-FD57EB39C09F}"/>
     <dgm:cxn modelId="{50A0776C-0CFB-4C43-ADEE-67944FDC79B0}" type="presOf" srcId="{D0581DE9-FDA9-4F2F-8C3B-AED67E9A6F09}" destId="{DC1F89FD-BF01-9943-A80A-05B4782E9D2D}" srcOrd="0" destOrd="0" presId="urn:microsoft.com/office/officeart/2005/8/layout/chevron1"/>
-    <dgm:cxn modelId="{F25DCB75-050D-1543-B06B-77F8A0E4C17F}" type="presOf" srcId="{B6E85E2C-2FC4-4DD4-8AE2-131240566A24}" destId="{9D8B4256-6149-A642-99E7-ED05F6BAC742}" srcOrd="0" destOrd="5" presId="urn:microsoft.com/office/officeart/2005/8/layout/chevron1"/>
     <dgm:cxn modelId="{24024177-B443-42EF-A6E5-A185CBE7B675}" srcId="{729966C0-85EB-400A-98F7-79343C8C6ACD}" destId="{7385691A-AC27-45CB-8BC0-4C14C3B4D268}" srcOrd="1" destOrd="0" parTransId="{71CB27F2-5716-4BD1-9DBE-EC292B45B42C}" sibTransId="{9D647610-5F54-45CD-B40B-B21C9259A8DB}"/>
     <dgm:cxn modelId="{2FA0BE7D-93A4-4090-9EB0-52BD99F8BA31}" srcId="{D8A7F02F-C383-440F-BBB4-261B35C34AD2}" destId="{CB09F59C-2B6E-415A-B47E-0B9C72B83ECA}" srcOrd="1" destOrd="0" parTransId="{3BCDFE88-9DA7-494B-831D-3DFA5CD2CEC1}" sibTransId="{017ECF6F-38AD-4440-BD99-016411A46887}"/>
     <dgm:cxn modelId="{D8814691-1B07-457E-B409-3D68E843B592}" srcId="{7385691A-AC27-45CB-8BC0-4C14C3B4D268}" destId="{D0581DE9-FDA9-4F2F-8C3B-AED67E9A6F09}" srcOrd="0" destOrd="0" parTransId="{1D8EFFD5-FDCA-4EB2-A56A-8A1D6930BD73}" sibTransId="{E60D6ECA-D371-4919-8923-D439A479CA48}"/>
-    <dgm:cxn modelId="{A81940A1-6BFA-1246-8331-B9787641D5A2}" type="presOf" srcId="{AEEC6DE5-7819-EE48-B228-1B86367BAC4C}" destId="{9D8B4256-6149-A642-99E7-ED05F6BAC742}" srcOrd="0" destOrd="2" presId="urn:microsoft.com/office/officeart/2005/8/layout/chevron1"/>
+    <dgm:cxn modelId="{65557394-E096-B949-9DC0-341A179851B3}" type="presOf" srcId="{2DBBDD1D-CFC4-004B-A394-DCB0F310B313}" destId="{9D8B4256-6149-A642-99E7-ED05F6BAC742}" srcOrd="0" destOrd="5" presId="urn:microsoft.com/office/officeart/2005/8/layout/chevron1"/>
+    <dgm:cxn modelId="{A81940A1-6BFA-1246-8331-B9787641D5A2}" type="presOf" srcId="{AEEC6DE5-7819-EE48-B228-1B86367BAC4C}" destId="{9D8B4256-6149-A642-99E7-ED05F6BAC742}" srcOrd="0" destOrd="3" presId="urn:microsoft.com/office/officeart/2005/8/layout/chevron1"/>
     <dgm:cxn modelId="{EC5CB7A2-D121-4D4A-AAB2-38AA2BB2B92B}" type="presOf" srcId="{D8A7F02F-C383-440F-BBB4-261B35C34AD2}" destId="{49C9308C-A382-9941-B08F-D81B7BFC21AE}" srcOrd="0" destOrd="0" presId="urn:microsoft.com/office/officeart/2005/8/layout/chevron1"/>
     <dgm:cxn modelId="{BD65FDAA-C6D3-45DC-86A3-B0A8EF7D70D5}" srcId="{729966C0-85EB-400A-98F7-79343C8C6ACD}" destId="{D8A7F02F-C383-440F-BBB4-261B35C34AD2}" srcOrd="2" destOrd="0" parTransId="{DE017C0C-47C8-4A69-A65D-62976F99A34B}" sibTransId="{BF9753E6-79B7-44AC-807A-B5312A315686}"/>
     <dgm:cxn modelId="{673CACAC-40DA-428C-89DE-F063A3153E15}" srcId="{5EA71323-4AA7-4D2D-95F8-8D1DC76ABDDE}" destId="{2AAB40B2-796D-4DC4-94E4-4A1550F1C571}" srcOrd="0" destOrd="0" parTransId="{D8FC0ED6-011A-41EC-B795-5419D656BCC5}" sibTransId="{4527EECE-2582-43F6-8255-89AFCDC5386F}"/>
     <dgm:cxn modelId="{22F670B3-060F-CA45-9C27-3E6348B41AD3}" type="presOf" srcId="{37241F5E-FCE8-4AB9-AEC6-EB530BE97F5D}" destId="{63A3A6EF-5BC8-C84F-A312-AE60DB55C992}" srcOrd="0" destOrd="0" presId="urn:microsoft.com/office/officeart/2005/8/layout/chevron1"/>
     <dgm:cxn modelId="{BE85C8B3-AE9C-4929-AD48-24FE239615F5}" srcId="{E3EFC1BD-6E85-4BDB-83AD-D0AB00B0EDA4}" destId="{6EF68EA5-A2B6-4CDF-B789-4DD2DF0ADB18}" srcOrd="0" destOrd="0" parTransId="{3B7C1FDD-DDFC-4B3F-BCE5-F52C38CE379C}" sibTransId="{3D145A8C-8346-461B-8209-76020E987680}"/>
     <dgm:cxn modelId="{57FEA3BD-28A1-1B40-BE94-BCB1A8259F4B}" type="presOf" srcId="{2A73C962-8F0A-480D-B11A-5B25743FD7E7}" destId="{DC1F89FD-BF01-9943-A80A-05B4782E9D2D}" srcOrd="0" destOrd="2" presId="urn:microsoft.com/office/officeart/2005/8/layout/chevron1"/>
-    <dgm:cxn modelId="{40DF98C3-4608-4601-841D-47B8C4443948}" srcId="{E3EFC1BD-6E85-4BDB-83AD-D0AB00B0EDA4}" destId="{B06117A6-1B5C-4D8D-8533-B8D00A041C68}" srcOrd="4" destOrd="0" parTransId="{EDE951CB-434E-4E1E-BAFD-BA6D0BACB736}" sibTransId="{86E26155-0B4A-4EE5-A585-DE1E9A7265A5}"/>
-    <dgm:cxn modelId="{F7B83ECB-55A5-A145-8762-FD72BB41D90B}" type="presOf" srcId="{72F25269-5A8D-4E36-B83A-4A33555E0864}" destId="{9D8B4256-6149-A642-99E7-ED05F6BAC742}" srcOrd="0" destOrd="3" presId="urn:microsoft.com/office/officeart/2005/8/layout/chevron1"/>
+    <dgm:cxn modelId="{F7B83ECB-55A5-A145-8762-FD72BB41D90B}" type="presOf" srcId="{72F25269-5A8D-4E36-B83A-4A33555E0864}" destId="{9D8B4256-6149-A642-99E7-ED05F6BAC742}" srcOrd="0" destOrd="4" presId="urn:microsoft.com/office/officeart/2005/8/layout/chevron1"/>
     <dgm:cxn modelId="{607EFACB-A449-4B4C-9E94-D964C409ADF2}" srcId="{7385691A-AC27-45CB-8BC0-4C14C3B4D268}" destId="{88FF6B09-8388-416B-AAA1-1100C1A9554B}" srcOrd="1" destOrd="0" parTransId="{22078BE6-E2F6-481B-BBCF-D419ECE9CB02}" sibTransId="{25CAF602-D8BD-4834-A8D6-78B99EF71290}"/>
     <dgm:cxn modelId="{793D23CD-EF00-8E41-8D9C-70BF5D1EBC32}" type="presOf" srcId="{CB09F59C-2B6E-415A-B47E-0B9C72B83ECA}" destId="{63A3A6EF-5BC8-C84F-A312-AE60DB55C992}" srcOrd="0" destOrd="1" presId="urn:microsoft.com/office/officeart/2005/8/layout/chevron1"/>
     <dgm:cxn modelId="{247235D0-46A4-CA4F-BCCF-1838A105FF01}" type="presOf" srcId="{88FF6B09-8388-416B-AAA1-1100C1A9554B}" destId="{DC1F89FD-BF01-9943-A80A-05B4782E9D2D}" srcOrd="0" destOrd="1" presId="urn:microsoft.com/office/officeart/2005/8/layout/chevron1"/>
     <dgm:cxn modelId="{6F58BDD0-0B00-40DF-8412-F78138713709}" srcId="{729966C0-85EB-400A-98F7-79343C8C6ACD}" destId="{5EA71323-4AA7-4D2D-95F8-8D1DC76ABDDE}" srcOrd="0" destOrd="0" parTransId="{DE981D2C-09D0-4C61-82FA-60DA22475FA8}" sibTransId="{7CFB6BE5-4716-42B6-BFA5-FA5B9092D73E}"/>
     <dgm:cxn modelId="{8F59B6E0-1D1B-4749-8EF3-99B8A5A0D853}" type="presOf" srcId="{E3EFC1BD-6E85-4BDB-83AD-D0AB00B0EDA4}" destId="{6E827F12-5349-234B-9D6A-FF23E00B94DB}" srcOrd="0" destOrd="0" presId="urn:microsoft.com/office/officeart/2005/8/layout/chevron1"/>
-    <dgm:cxn modelId="{2B79C9E3-C9B8-0A46-A196-FD1C2F69BC17}" type="presOf" srcId="{B06117A6-1B5C-4D8D-8533-B8D00A041C68}" destId="{9D8B4256-6149-A642-99E7-ED05F6BAC742}" srcOrd="0" destOrd="4" presId="urn:microsoft.com/office/officeart/2005/8/layout/chevron1"/>
-    <dgm:cxn modelId="{8B44F8EF-EE88-7E4A-9807-75401E3890CE}" srcId="{E3EFC1BD-6E85-4BDB-83AD-D0AB00B0EDA4}" destId="{AEEC6DE5-7819-EE48-B228-1B86367BAC4C}" srcOrd="2" destOrd="0" parTransId="{229F57F6-8C5B-6741-AA74-C4673E1AC971}" sibTransId="{DED6F00C-4A99-9240-A90A-8CCE49D68AF8}"/>
-    <dgm:cxn modelId="{CB3707FC-7698-48C2-A33C-6D59223F8F53}" srcId="{E3EFC1BD-6E85-4BDB-83AD-D0AB00B0EDA4}" destId="{72F25269-5A8D-4E36-B83A-4A33555E0864}" srcOrd="3" destOrd="0" parTransId="{66E50CF5-05C2-4F65-B9A3-57BB6944F05D}" sibTransId="{64957A72-7181-4CD3-83C4-55DE5D1769CF}"/>
+    <dgm:cxn modelId="{8B44F8EF-EE88-7E4A-9807-75401E3890CE}" srcId="{E3EFC1BD-6E85-4BDB-83AD-D0AB00B0EDA4}" destId="{AEEC6DE5-7819-EE48-B228-1B86367BAC4C}" srcOrd="3" destOrd="0" parTransId="{229F57F6-8C5B-6741-AA74-C4673E1AC971}" sibTransId="{DED6F00C-4A99-9240-A90A-8CCE49D68AF8}"/>
+    <dgm:cxn modelId="{CB3707FC-7698-48C2-A33C-6D59223F8F53}" srcId="{E3EFC1BD-6E85-4BDB-83AD-D0AB00B0EDA4}" destId="{72F25269-5A8D-4E36-B83A-4A33555E0864}" srcOrd="4" destOrd="0" parTransId="{66E50CF5-05C2-4F65-B9A3-57BB6944F05D}" sibTransId="{64957A72-7181-4CD3-83C4-55DE5D1769CF}"/>
     <dgm:cxn modelId="{6C2C2DD1-C8C5-2044-BBC9-B5932A05087D}" type="presParOf" srcId="{D6EE7385-5CC8-6F4E-83E4-60517F7A88E7}" destId="{F875F264-7834-6240-B543-C84B931E06D8}" srcOrd="0" destOrd="0" presId="urn:microsoft.com/office/officeart/2005/8/layout/chevron1"/>
     <dgm:cxn modelId="{33623259-4401-0346-B952-462A3A58E145}" type="presParOf" srcId="{F875F264-7834-6240-B543-C84B931E06D8}" destId="{13E4EB7F-9949-2048-8FDE-5F044882C5F4}" srcOrd="0" destOrd="0" presId="urn:microsoft.com/office/officeart/2005/8/layout/chevron1"/>
     <dgm:cxn modelId="{37441404-C342-7943-8463-4E959042D953}" type="presParOf" srcId="{F875F264-7834-6240-B543-C84B931E06D8}" destId="{EFB97F1A-EDB0-7940-B723-E024019E48AF}" srcOrd="1" destOrd="0" presId="urn:microsoft.com/office/officeart/2005/8/layout/chevron1"/>
@@ -10206,6 +10211,24 @@
           </a:pPr>
           <a:r>
             <a:rPr lang="en-US" sz="2100" kern="1200" dirty="0"/>
+            <a:t>Fingerprint Scanner</a:t>
+          </a:r>
+        </a:p>
+        <a:p>
+          <a:pPr marL="228600" lvl="1" indent="-228600" algn="l" defTabSz="933450">
+            <a:lnSpc>
+              <a:spcPct val="90000"/>
+            </a:lnSpc>
+            <a:spcBef>
+              <a:spcPct val="0"/>
+            </a:spcBef>
+            <a:spcAft>
+              <a:spcPct val="15000"/>
+            </a:spcAft>
+            <a:buChar char="•"/>
+          </a:pPr>
+          <a:r>
+            <a:rPr lang="en-US" sz="2100" kern="1200" dirty="0"/>
             <a:t>Wi-Fi Module</a:t>
           </a:r>
         </a:p>
@@ -10259,8 +10282,8 @@
             <a:buChar char="•"/>
           </a:pPr>
           <a:r>
-            <a:rPr lang="en-US" sz="2100" kern="1200"/>
-            <a:t>Power Button</a:t>
+            <a:rPr lang="en-US" sz="2100" kern="1200" dirty="0"/>
+            <a:t>Text Message</a:t>
           </a:r>
         </a:p>
         <a:p>
@@ -10278,24 +10301,6 @@
           </a:pPr>
           <a:r>
             <a:rPr lang="en-US" sz="2100" kern="1200" dirty="0"/>
-            <a:t>Fingerprint Scanner</a:t>
-          </a:r>
-        </a:p>
-        <a:p>
-          <a:pPr marL="228600" lvl="1" indent="-228600" algn="l" defTabSz="933450">
-            <a:lnSpc>
-              <a:spcPct val="90000"/>
-            </a:lnSpc>
-            <a:spcBef>
-              <a:spcPct val="0"/>
-            </a:spcBef>
-            <a:spcAft>
-              <a:spcPct val="15000"/>
-            </a:spcAft>
-            <a:buChar char="•"/>
-          </a:pPr>
-          <a:r>
-            <a:rPr lang="en-US" sz="2100" kern="1200"/>
             <a:t>Apple HomeKit</a:t>
           </a:r>
         </a:p>
@@ -18680,7 +18685,7 @@
           <a:p>
             <a:fld id="{2C6F5E1F-DB80-444E-9AD9-8F2AEEE53799}" type="datetimeFigureOut">
               <a:rPr lang="en-US" smtClean="0"/>
-              <a:t>12/8/25</a:t>
+              <a:t>12/9/25</a:t>
             </a:fld>
             <a:endParaRPr lang="en-US"/>
           </a:p>
@@ -20548,7 +20553,7 @@
           <a:p>
             <a:fld id="{02AC24A9-CCB6-4F8D-B8DB-C2F3692CFA5A}" type="datetimeFigureOut">
               <a:rPr lang="en-US" smtClean="0"/>
-              <a:t>12/8/25</a:t>
+              <a:t>12/9/25</a:t>
             </a:fld>
             <a:endParaRPr lang="en-US" dirty="0"/>
           </a:p>
@@ -20918,7 +20923,7 @@
           <a:p>
             <a:fld id="{02AC24A9-CCB6-4F8D-B8DB-C2F3692CFA5A}" type="datetimeFigureOut">
               <a:rPr lang="en-US" smtClean="0"/>
-              <a:t>12/8/25</a:t>
+              <a:t>12/9/25</a:t>
             </a:fld>
             <a:endParaRPr lang="en-US"/>
           </a:p>
@@ -21127,7 +21132,7 @@
           <a:p>
             <a:fld id="{02AC24A9-CCB6-4F8D-B8DB-C2F3692CFA5A}" type="datetimeFigureOut">
               <a:rPr lang="en-US" smtClean="0"/>
-              <a:t>12/8/25</a:t>
+              <a:t>12/9/25</a:t>
             </a:fld>
             <a:endParaRPr lang="en-US"/>
           </a:p>
@@ -21597,7 +21602,7 @@
           <a:p>
             <a:fld id="{02AC24A9-CCB6-4F8D-B8DB-C2F3692CFA5A}" type="datetimeFigureOut">
               <a:rPr lang="en-US" smtClean="0"/>
-              <a:t>12/8/25</a:t>
+              <a:t>12/9/25</a:t>
             </a:fld>
             <a:endParaRPr lang="en-US"/>
           </a:p>
@@ -22051,7 +22056,7 @@
           <a:p>
             <a:fld id="{02AC24A9-CCB6-4F8D-B8DB-C2F3692CFA5A}" type="datetimeFigureOut">
               <a:rPr lang="en-US" smtClean="0"/>
-              <a:t>12/8/25</a:t>
+              <a:t>12/9/25</a:t>
             </a:fld>
             <a:endParaRPr lang="en-US"/>
           </a:p>
@@ -22583,7 +22588,7 @@
           <a:p>
             <a:fld id="{02AC24A9-CCB6-4F8D-B8DB-C2F3692CFA5A}" type="datetimeFigureOut">
               <a:rPr lang="en-US" smtClean="0"/>
-              <a:t>12/8/25</a:t>
+              <a:t>12/9/25</a:t>
             </a:fld>
             <a:endParaRPr lang="en-US"/>
           </a:p>
@@ -23282,7 +23287,7 @@
           <a:p>
             <a:fld id="{02AC24A9-CCB6-4F8D-B8DB-C2F3692CFA5A}" type="datetimeFigureOut">
               <a:rPr lang="en-US" smtClean="0"/>
-              <a:t>12/8/25</a:t>
+              <a:t>12/9/25</a:t>
             </a:fld>
             <a:endParaRPr lang="en-US"/>
           </a:p>
@@ -23611,7 +23616,7 @@
           <a:p>
             <a:fld id="{02AC24A9-CCB6-4F8D-B8DB-C2F3692CFA5A}" type="datetimeFigureOut">
               <a:rPr lang="en-US" smtClean="0"/>
-              <a:t>12/8/25</a:t>
+              <a:t>12/9/25</a:t>
             </a:fld>
             <a:endParaRPr lang="en-US"/>
           </a:p>
@@ -23724,7 +23729,7 @@
           <a:p>
             <a:fld id="{02AC24A9-CCB6-4F8D-B8DB-C2F3692CFA5A}" type="datetimeFigureOut">
               <a:rPr lang="en-US" smtClean="0"/>
-              <a:t>12/8/25</a:t>
+              <a:t>12/9/25</a:t>
             </a:fld>
             <a:endParaRPr lang="en-US"/>
           </a:p>
@@ -24219,7 +24224,7 @@
           <a:p>
             <a:fld id="{02AC24A9-CCB6-4F8D-B8DB-C2F3692CFA5A}" type="datetimeFigureOut">
               <a:rPr lang="en-US" smtClean="0"/>
-              <a:t>12/8/25</a:t>
+              <a:t>12/9/25</a:t>
             </a:fld>
             <a:endParaRPr lang="en-US" dirty="0"/>
           </a:p>
@@ -24696,7 +24701,7 @@
           <a:p>
             <a:fld id="{02AC24A9-CCB6-4F8D-B8DB-C2F3692CFA5A}" type="datetimeFigureOut">
               <a:rPr lang="en-US" smtClean="0"/>
-              <a:t>12/8/25</a:t>
+              <a:t>12/9/25</a:t>
             </a:fld>
             <a:endParaRPr lang="en-US"/>
           </a:p>
@@ -24939,7 +24944,7 @@
           <a:p>
             <a:fld id="{02AC24A9-CCB6-4F8D-B8DB-C2F3692CFA5A}" type="datetimeFigureOut">
               <a:rPr lang="en-US" smtClean="0"/>
-              <a:t>12/8/25</a:t>
+              <a:t>12/9/25</a:t>
             </a:fld>
             <a:endParaRPr lang="en-US"/>
           </a:p>
@@ -30038,7 +30043,7 @@
             <p:ph idx="1"/>
             <p:extLst>
               <p:ext uri="{D42A27DB-BD31-4B8C-83A1-F6EECF244321}">
-                <p14:modId xmlns:p14="http://schemas.microsoft.com/office/powerpoint/2010/main" val="4214604262"/>
+                <p14:modId xmlns:p14="http://schemas.microsoft.com/office/powerpoint/2010/main" val="3022181136"/>
               </p:ext>
             </p:extLst>
           </p:nvPr>

</xml_diff>

<commit_message>
Update presentation slides for project
</commit_message>
<xml_diff>
--- a/UpadhyayaN-Presentation.pptx
+++ b/UpadhyayaN-Presentation.pptx
@@ -3675,11 +3675,11 @@
 </file>
 
 <file path=ppt/diagrams/colors5.xml><?xml version="1.0" encoding="utf-8"?>
-<dgm:colorsDef xmlns:dgm="http://schemas.openxmlformats.org/drawingml/2006/diagram" xmlns:a="http://schemas.openxmlformats.org/drawingml/2006/main" uniqueId="urn:microsoft.com/office/officeart/2005/8/colors/colorful1">
+<dgm:colorsDef xmlns:dgm="http://schemas.openxmlformats.org/drawingml/2006/diagram" xmlns:a="http://schemas.openxmlformats.org/drawingml/2006/main" uniqueId="urn:microsoft.com/office/officeart/2005/8/colors/colorful2">
   <dgm:title val=""/>
   <dgm:desc val=""/>
   <dgm:catLst>
-    <dgm:cat type="colorful" pri="10100"/>
+    <dgm:cat type="colorful" pri="10200"/>
   </dgm:catLst>
   <dgm:styleLbl name="node0">
     <dgm:fillClrLst meth="repeat">
@@ -3694,12 +3694,9 @@
     <dgm:txEffectClrLst/>
   </dgm:styleLbl>
   <dgm:styleLbl name="node1">
-    <dgm:fillClrLst meth="repeat">
+    <dgm:fillClrLst>
       <a:schemeClr val="accent2"/>
       <a:schemeClr val="accent3"/>
-      <a:schemeClr val="accent4"/>
-      <a:schemeClr val="accent5"/>
-      <a:schemeClr val="accent6"/>
     </dgm:fillClrLst>
     <dgm:linClrLst meth="repeat">
       <a:schemeClr val="lt1"/>
@@ -3710,19 +3707,13 @@
     <dgm:txEffectClrLst/>
   </dgm:styleLbl>
   <dgm:styleLbl name="alignNode1">
-    <dgm:fillClrLst meth="repeat">
+    <dgm:fillClrLst>
       <a:schemeClr val="accent2"/>
       <a:schemeClr val="accent3"/>
-      <a:schemeClr val="accent4"/>
-      <a:schemeClr val="accent5"/>
-      <a:schemeClr val="accent6"/>
     </dgm:fillClrLst>
-    <dgm:linClrLst meth="repeat">
+    <dgm:linClrLst>
       <a:schemeClr val="accent2"/>
       <a:schemeClr val="accent3"/>
-      <a:schemeClr val="accent4"/>
-      <a:schemeClr val="accent5"/>
-      <a:schemeClr val="accent6"/>
     </dgm:linClrLst>
     <dgm:effectClrLst/>
     <dgm:txLinClrLst/>
@@ -3730,12 +3721,9 @@
     <dgm:txEffectClrLst/>
   </dgm:styleLbl>
   <dgm:styleLbl name="lnNode1">
-    <dgm:fillClrLst meth="repeat">
+    <dgm:fillClrLst>
       <a:schemeClr val="accent2"/>
       <a:schemeClr val="accent3"/>
-      <a:schemeClr val="accent4"/>
-      <a:schemeClr val="accent5"/>
-      <a:schemeClr val="accent6"/>
     </dgm:fillClrLst>
     <dgm:linClrLst meth="repeat">
       <a:schemeClr val="lt1"/>
@@ -3746,20 +3734,11 @@
     <dgm:txEffectClrLst/>
   </dgm:styleLbl>
   <dgm:styleLbl name="vennNode1">
-    <dgm:fillClrLst meth="repeat">
+    <dgm:fillClrLst>
       <a:schemeClr val="accent2">
         <a:alpha val="50000"/>
       </a:schemeClr>
       <a:schemeClr val="accent3">
-        <a:alpha val="50000"/>
-      </a:schemeClr>
-      <a:schemeClr val="accent4">
-        <a:alpha val="50000"/>
-      </a:schemeClr>
-      <a:schemeClr val="accent5">
-        <a:alpha val="50000"/>
-      </a:schemeClr>
-      <a:schemeClr val="accent6">
         <a:alpha val="50000"/>
       </a:schemeClr>
     </dgm:fillClrLst>
@@ -3772,18 +3751,6 @@
     <dgm:txEffectClrLst/>
   </dgm:styleLbl>
   <dgm:styleLbl name="node2">
-    <dgm:fillClrLst>
-      <a:schemeClr val="accent2"/>
-    </dgm:fillClrLst>
-    <dgm:linClrLst meth="repeat">
-      <a:schemeClr val="lt1"/>
-    </dgm:linClrLst>
-    <dgm:effectClrLst/>
-    <dgm:txLinClrLst/>
-    <dgm:txFillClrLst/>
-    <dgm:txEffectClrLst/>
-  </dgm:styleLbl>
-  <dgm:styleLbl name="node3">
     <dgm:fillClrLst>
       <a:schemeClr val="accent3"/>
     </dgm:fillClrLst>
@@ -3795,7 +3762,7 @@
     <dgm:txFillClrLst/>
     <dgm:txEffectClrLst/>
   </dgm:styleLbl>
-  <dgm:styleLbl name="node4">
+  <dgm:styleLbl name="node3">
     <dgm:fillClrLst>
       <a:schemeClr val="accent4"/>
     </dgm:fillClrLst>
@@ -3807,21 +3774,24 @@
     <dgm:txFillClrLst/>
     <dgm:txEffectClrLst/>
   </dgm:styleLbl>
+  <dgm:styleLbl name="node4">
+    <dgm:fillClrLst>
+      <a:schemeClr val="accent5"/>
+    </dgm:fillClrLst>
+    <dgm:linClrLst meth="repeat">
+      <a:schemeClr val="lt1"/>
+    </dgm:linClrLst>
+    <dgm:effectClrLst/>
+    <dgm:txLinClrLst/>
+    <dgm:txFillClrLst/>
+    <dgm:txEffectClrLst/>
+  </dgm:styleLbl>
   <dgm:styleLbl name="fgImgPlace1">
-    <dgm:fillClrLst meth="repeat">
+    <dgm:fillClrLst>
       <a:schemeClr val="accent2">
         <a:tint val="50000"/>
       </a:schemeClr>
       <a:schemeClr val="accent3">
-        <a:tint val="50000"/>
-      </a:schemeClr>
-      <a:schemeClr val="accent4">
-        <a:tint val="50000"/>
-      </a:schemeClr>
-      <a:schemeClr val="accent5">
-        <a:tint val="50000"/>
-      </a:schemeClr>
-      <a:schemeClr val="accent6">
         <a:tint val="50000"/>
       </a:schemeClr>
     </dgm:fillClrLst>
@@ -3837,10 +3807,10 @@
   </dgm:styleLbl>
   <dgm:styleLbl name="alignImgPlace1">
     <dgm:fillClrLst>
-      <a:schemeClr val="accent1">
+      <a:schemeClr val="accent2">
         <a:tint val="50000"/>
       </a:schemeClr>
-      <a:schemeClr val="accent2">
+      <a:schemeClr val="accent3">
         <a:tint val="20000"/>
       </a:schemeClr>
     </dgm:fillClrLst>
@@ -3856,10 +3826,10 @@
   </dgm:styleLbl>
   <dgm:styleLbl name="bgImgPlace1">
     <dgm:fillClrLst>
-      <a:schemeClr val="accent1">
+      <a:schemeClr val="accent2">
         <a:tint val="50000"/>
       </a:schemeClr>
-      <a:schemeClr val="accent2">
+      <a:schemeClr val="accent3">
         <a:tint val="20000"/>
       </a:schemeClr>
     </dgm:fillClrLst>
@@ -3874,121 +3844,8 @@
     <dgm:txEffectClrLst/>
   </dgm:styleLbl>
   <dgm:styleLbl name="sibTrans2D1">
-    <dgm:fillClrLst meth="repeat">
+    <dgm:fillClrLst>
       <a:schemeClr val="accent2"/>
-      <a:schemeClr val="accent3"/>
-      <a:schemeClr val="accent4"/>
-      <a:schemeClr val="accent5"/>
-      <a:schemeClr val="accent6"/>
-    </dgm:fillClrLst>
-    <dgm:linClrLst meth="cycle">
-      <a:schemeClr val="lt1"/>
-    </dgm:linClrLst>
-    <dgm:effectClrLst/>
-    <dgm:txLinClrLst/>
-    <dgm:txFillClrLst/>
-    <dgm:txEffectClrLst/>
-  </dgm:styleLbl>
-  <dgm:styleLbl name="fgSibTrans2D1">
-    <dgm:fillClrLst meth="repeat">
-      <a:schemeClr val="accent2"/>
-      <a:schemeClr val="accent3"/>
-      <a:schemeClr val="accent4"/>
-      <a:schemeClr val="accent5"/>
-      <a:schemeClr val="accent6"/>
-    </dgm:fillClrLst>
-    <dgm:linClrLst meth="cycle">
-      <a:schemeClr val="lt1"/>
-    </dgm:linClrLst>
-    <dgm:effectClrLst/>
-    <dgm:txLinClrLst/>
-    <dgm:txFillClrLst meth="repeat">
-      <a:schemeClr val="lt1"/>
-    </dgm:txFillClrLst>
-    <dgm:txEffectClrLst/>
-  </dgm:styleLbl>
-  <dgm:styleLbl name="bgSibTrans2D1">
-    <dgm:fillClrLst meth="repeat">
-      <a:schemeClr val="accent2"/>
-      <a:schemeClr val="accent3"/>
-      <a:schemeClr val="accent4"/>
-      <a:schemeClr val="accent5"/>
-      <a:schemeClr val="accent6"/>
-    </dgm:fillClrLst>
-    <dgm:linClrLst meth="cycle">
-      <a:schemeClr val="lt1"/>
-    </dgm:linClrLst>
-    <dgm:effectClrLst/>
-    <dgm:txLinClrLst/>
-    <dgm:txFillClrLst meth="repeat">
-      <a:schemeClr val="lt1"/>
-    </dgm:txFillClrLst>
-    <dgm:txEffectClrLst/>
-  </dgm:styleLbl>
-  <dgm:styleLbl name="sibTrans1D1">
-    <dgm:fillClrLst meth="repeat">
-      <a:schemeClr val="accent2"/>
-      <a:schemeClr val="accent3"/>
-      <a:schemeClr val="accent4"/>
-      <a:schemeClr val="accent5"/>
-      <a:schemeClr val="accent6"/>
-    </dgm:fillClrLst>
-    <dgm:linClrLst meth="repeat">
-      <a:schemeClr val="accent2"/>
-      <a:schemeClr val="accent3"/>
-      <a:schemeClr val="accent4"/>
-      <a:schemeClr val="accent5"/>
-      <a:schemeClr val="accent6"/>
-    </dgm:linClrLst>
-    <dgm:effectClrLst/>
-    <dgm:txLinClrLst/>
-    <dgm:txFillClrLst meth="repeat">
-      <a:schemeClr val="tx1"/>
-    </dgm:txFillClrLst>
-    <dgm:txEffectClrLst/>
-  </dgm:styleLbl>
-  <dgm:styleLbl name="callout">
-    <dgm:fillClrLst meth="repeat">
-      <a:schemeClr val="accent2"/>
-    </dgm:fillClrLst>
-    <dgm:linClrLst meth="repeat">
-      <a:schemeClr val="accent2">
-        <a:tint val="50000"/>
-      </a:schemeClr>
-    </dgm:linClrLst>
-    <dgm:effectClrLst/>
-    <dgm:txLinClrLst/>
-    <dgm:txFillClrLst meth="repeat">
-      <a:schemeClr val="tx1"/>
-    </dgm:txFillClrLst>
-    <dgm:txEffectClrLst/>
-  </dgm:styleLbl>
-  <dgm:styleLbl name="asst0">
-    <dgm:fillClrLst meth="repeat">
-      <a:schemeClr val="accent1"/>
-    </dgm:fillClrLst>
-    <dgm:linClrLst meth="repeat">
-      <a:schemeClr val="lt1"/>
-    </dgm:linClrLst>
-    <dgm:effectClrLst/>
-    <dgm:txLinClrLst/>
-    <dgm:txFillClrLst/>
-    <dgm:txEffectClrLst/>
-  </dgm:styleLbl>
-  <dgm:styleLbl name="asst1">
-    <dgm:fillClrLst meth="repeat">
-      <a:schemeClr val="accent2"/>
-    </dgm:fillClrLst>
-    <dgm:linClrLst meth="repeat">
-      <a:schemeClr val="lt1"/>
-    </dgm:linClrLst>
-    <dgm:effectClrLst/>
-    <dgm:txLinClrLst/>
-    <dgm:txFillClrLst/>
-    <dgm:txEffectClrLst/>
-  </dgm:styleLbl>
-  <dgm:styleLbl name="asst2">
-    <dgm:fillClrLst>
       <a:schemeClr val="accent3"/>
     </dgm:fillClrLst>
     <dgm:linClrLst meth="repeat">
@@ -3999,7 +3856,94 @@
     <dgm:txFillClrLst/>
     <dgm:txEffectClrLst/>
   </dgm:styleLbl>
-  <dgm:styleLbl name="asst3">
+  <dgm:styleLbl name="fgSibTrans2D1">
+    <dgm:fillClrLst>
+      <a:schemeClr val="accent2"/>
+      <a:schemeClr val="accent3"/>
+    </dgm:fillClrLst>
+    <dgm:linClrLst meth="repeat">
+      <a:schemeClr val="lt1"/>
+    </dgm:linClrLst>
+    <dgm:effectClrLst/>
+    <dgm:txLinClrLst/>
+    <dgm:txFillClrLst meth="repeat">
+      <a:schemeClr val="lt1"/>
+    </dgm:txFillClrLst>
+    <dgm:txEffectClrLst/>
+  </dgm:styleLbl>
+  <dgm:styleLbl name="bgSibTrans2D1">
+    <dgm:fillClrLst>
+      <a:schemeClr val="accent2"/>
+      <a:schemeClr val="accent3"/>
+    </dgm:fillClrLst>
+    <dgm:linClrLst meth="repeat">
+      <a:schemeClr val="lt1"/>
+    </dgm:linClrLst>
+    <dgm:effectClrLst/>
+    <dgm:txLinClrLst/>
+    <dgm:txFillClrLst meth="repeat">
+      <a:schemeClr val="lt1"/>
+    </dgm:txFillClrLst>
+    <dgm:txEffectClrLst/>
+  </dgm:styleLbl>
+  <dgm:styleLbl name="sibTrans1D1">
+    <dgm:fillClrLst/>
+    <dgm:linClrLst>
+      <a:schemeClr val="accent2"/>
+      <a:schemeClr val="accent3"/>
+    </dgm:linClrLst>
+    <dgm:effectClrLst/>
+    <dgm:txLinClrLst/>
+    <dgm:txFillClrLst meth="repeat">
+      <a:schemeClr val="tx1"/>
+    </dgm:txFillClrLst>
+    <dgm:txEffectClrLst/>
+  </dgm:styleLbl>
+  <dgm:styleLbl name="callout">
+    <dgm:fillClrLst meth="repeat">
+      <a:schemeClr val="accent2"/>
+    </dgm:fillClrLst>
+    <dgm:linClrLst meth="repeat">
+      <a:schemeClr val="accent2">
+        <a:tint val="50000"/>
+      </a:schemeClr>
+    </dgm:linClrLst>
+    <dgm:effectClrLst/>
+    <dgm:txLinClrLst/>
+    <dgm:txFillClrLst meth="repeat">
+      <a:schemeClr val="tx1"/>
+    </dgm:txFillClrLst>
+    <dgm:txEffectClrLst/>
+  </dgm:styleLbl>
+  <dgm:styleLbl name="asst0">
+    <dgm:fillClrLst meth="repeat">
+      <a:schemeClr val="accent2"/>
+    </dgm:fillClrLst>
+    <dgm:linClrLst meth="repeat">
+      <a:schemeClr val="lt1">
+        <a:shade val="80000"/>
+      </a:schemeClr>
+    </dgm:linClrLst>
+    <dgm:effectClrLst/>
+    <dgm:txLinClrLst/>
+    <dgm:txFillClrLst/>
+    <dgm:txEffectClrLst/>
+  </dgm:styleLbl>
+  <dgm:styleLbl name="asst1">
+    <dgm:fillClrLst meth="repeat">
+      <a:schemeClr val="accent3"/>
+    </dgm:fillClrLst>
+    <dgm:linClrLst meth="repeat">
+      <a:schemeClr val="lt1">
+        <a:shade val="80000"/>
+      </a:schemeClr>
+    </dgm:linClrLst>
+    <dgm:effectClrLst/>
+    <dgm:txLinClrLst/>
+    <dgm:txFillClrLst/>
+    <dgm:txEffectClrLst/>
+  </dgm:styleLbl>
+  <dgm:styleLbl name="asst2">
     <dgm:fillClrLst>
       <a:schemeClr val="accent4"/>
     </dgm:fillClrLst>
@@ -4011,9 +3955,21 @@
     <dgm:txFillClrLst/>
     <dgm:txEffectClrLst/>
   </dgm:styleLbl>
+  <dgm:styleLbl name="asst3">
+    <dgm:fillClrLst>
+      <a:schemeClr val="accent5"/>
+    </dgm:fillClrLst>
+    <dgm:linClrLst meth="repeat">
+      <a:schemeClr val="lt1"/>
+    </dgm:linClrLst>
+    <dgm:effectClrLst/>
+    <dgm:txLinClrLst/>
+    <dgm:txFillClrLst/>
+    <dgm:txEffectClrLst/>
+  </dgm:styleLbl>
   <dgm:styleLbl name="asst4">
     <dgm:fillClrLst>
-      <a:schemeClr val="accent5"/>
+      <a:schemeClr val="accent6"/>
     </dgm:fillClrLst>
     <dgm:linClrLst meth="repeat">
       <a:schemeClr val="lt1"/>
@@ -4080,22 +4036,6 @@
       <a:schemeClr val="accent2"/>
     </dgm:fillClrLst>
     <dgm:linClrLst meth="repeat">
-      <a:schemeClr val="accent1"/>
-    </dgm:linClrLst>
-    <dgm:effectClrLst/>
-    <dgm:txLinClrLst/>
-    <dgm:txFillClrLst meth="repeat">
-      <a:schemeClr val="tx1"/>
-    </dgm:txFillClrLst>
-    <dgm:txEffectClrLst/>
-  </dgm:styleLbl>
-  <dgm:styleLbl name="parChTrans1D2">
-    <dgm:fillClrLst meth="repeat">
-      <a:schemeClr val="accent3">
-        <a:tint val="90000"/>
-      </a:schemeClr>
-    </dgm:fillClrLst>
-    <dgm:linClrLst meth="repeat">
       <a:schemeClr val="accent2"/>
     </dgm:linClrLst>
     <dgm:effectClrLst/>
@@ -4105,10 +4045,10 @@
     </dgm:txFillClrLst>
     <dgm:txEffectClrLst/>
   </dgm:styleLbl>
-  <dgm:styleLbl name="parChTrans1D3">
+  <dgm:styleLbl name="parChTrans1D2">
     <dgm:fillClrLst meth="repeat">
-      <a:schemeClr val="accent4">
-        <a:tint val="70000"/>
+      <a:schemeClr val="accent2">
+        <a:tint val="90000"/>
       </a:schemeClr>
     </dgm:fillClrLst>
     <dgm:linClrLst meth="repeat">
@@ -4121,10 +4061,10 @@
     </dgm:txFillClrLst>
     <dgm:txEffectClrLst/>
   </dgm:styleLbl>
-  <dgm:styleLbl name="parChTrans1D4">
+  <dgm:styleLbl name="parChTrans1D3">
     <dgm:fillClrLst meth="repeat">
-      <a:schemeClr val="accent5">
-        <a:tint val="50000"/>
+      <a:schemeClr val="accent2">
+        <a:tint val="70000"/>
       </a:schemeClr>
     </dgm:fillClrLst>
     <dgm:linClrLst meth="repeat">
@@ -4137,18 +4077,31 @@
     </dgm:txFillClrLst>
     <dgm:txEffectClrLst/>
   </dgm:styleLbl>
+  <dgm:styleLbl name="parChTrans1D4">
+    <dgm:fillClrLst meth="repeat">
+      <a:schemeClr val="accent2">
+        <a:tint val="50000"/>
+      </a:schemeClr>
+    </dgm:fillClrLst>
+    <dgm:linClrLst meth="repeat">
+      <a:schemeClr val="accent5"/>
+    </dgm:linClrLst>
+    <dgm:effectClrLst/>
+    <dgm:txLinClrLst/>
+    <dgm:txFillClrLst meth="repeat">
+      <a:schemeClr val="tx1"/>
+    </dgm:txFillClrLst>
+    <dgm:txEffectClrLst/>
+  </dgm:styleLbl>
   <dgm:styleLbl name="fgAcc1">
     <dgm:fillClrLst meth="repeat">
       <a:schemeClr val="lt1">
         <a:alpha val="90000"/>
       </a:schemeClr>
     </dgm:fillClrLst>
-    <dgm:linClrLst meth="repeat">
+    <dgm:linClrLst>
       <a:schemeClr val="accent2"/>
       <a:schemeClr val="accent3"/>
-      <a:schemeClr val="accent4"/>
-      <a:schemeClr val="accent5"/>
-      <a:schemeClr val="accent6"/>
     </dgm:linClrLst>
     <dgm:effectClrLst/>
     <dgm:txLinClrLst/>
@@ -4163,12 +4116,9 @@
         <a:alpha val="90000"/>
       </a:schemeClr>
     </dgm:fillClrLst>
-    <dgm:linClrLst meth="repeat">
+    <dgm:linClrLst>
       <a:schemeClr val="accent2"/>
       <a:schemeClr val="accent3"/>
-      <a:schemeClr val="accent4"/>
-      <a:schemeClr val="accent5"/>
-      <a:schemeClr val="accent6"/>
     </dgm:linClrLst>
     <dgm:effectClrLst/>
     <dgm:txLinClrLst/>
@@ -4183,12 +4133,9 @@
         <a:alpha val="90000"/>
       </a:schemeClr>
     </dgm:fillClrLst>
-    <dgm:linClrLst meth="repeat">
+    <dgm:linClrLst>
       <a:schemeClr val="accent2"/>
       <a:schemeClr val="accent3"/>
-      <a:schemeClr val="accent4"/>
-      <a:schemeClr val="accent5"/>
-      <a:schemeClr val="accent6"/>
     </dgm:linClrLst>
     <dgm:effectClrLst/>
     <dgm:txLinClrLst/>
@@ -4204,7 +4151,7 @@
       </a:schemeClr>
     </dgm:fillClrLst>
     <dgm:linClrLst meth="repeat">
-      <a:schemeClr val="accent1"/>
+      <a:schemeClr val="accent2"/>
     </dgm:linClrLst>
     <dgm:effectClrLst/>
     <dgm:txLinClrLst/>
@@ -4219,12 +4166,9 @@
         <a:alpha val="90000"/>
       </a:schemeClr>
     </dgm:fillClrLst>
-    <dgm:linClrLst meth="repeat">
+    <dgm:linClrLst>
       <a:schemeClr val="accent2"/>
       <a:schemeClr val="accent3"/>
-      <a:schemeClr val="accent4"/>
-      <a:schemeClr val="accent5"/>
-      <a:schemeClr val="accent6"/>
     </dgm:linClrLst>
     <dgm:effectClrLst/>
     <dgm:txLinClrLst/>
@@ -4237,12 +4181,9 @@
     <dgm:fillClrLst meth="repeat">
       <a:schemeClr val="lt1"/>
     </dgm:fillClrLst>
-    <dgm:linClrLst meth="repeat">
+    <dgm:linClrLst>
       <a:schemeClr val="accent2"/>
       <a:schemeClr val="accent3"/>
-      <a:schemeClr val="accent4"/>
-      <a:schemeClr val="accent5"/>
-      <a:schemeClr val="accent6"/>
     </dgm:linClrLst>
     <dgm:effectClrLst/>
     <dgm:txLinClrLst/>
@@ -4255,12 +4196,9 @@
     <dgm:fillClrLst meth="repeat">
       <a:schemeClr val="lt1"/>
     </dgm:fillClrLst>
-    <dgm:linClrLst meth="repeat">
+    <dgm:linClrLst>
       <a:schemeClr val="accent2"/>
       <a:schemeClr val="accent3"/>
-      <a:schemeClr val="accent4"/>
-      <a:schemeClr val="accent5"/>
-      <a:schemeClr val="accent6"/>
     </dgm:linClrLst>
     <dgm:effectClrLst/>
     <dgm:txLinClrLst/>
@@ -4273,12 +4211,9 @@
     <dgm:fillClrLst meth="repeat">
       <a:schemeClr val="lt1"/>
     </dgm:fillClrLst>
-    <dgm:linClrLst meth="repeat">
+    <dgm:linClrLst>
       <a:schemeClr val="accent2"/>
       <a:schemeClr val="accent3"/>
-      <a:schemeClr val="accent4"/>
-      <a:schemeClr val="accent5"/>
-      <a:schemeClr val="accent6"/>
     </dgm:linClrLst>
     <dgm:effectClrLst/>
     <dgm:txLinClrLst/>
@@ -4288,7 +4223,7 @@
     <dgm:txEffectClrLst/>
   </dgm:styleLbl>
   <dgm:styleLbl name="fgAccFollowNode1">
-    <dgm:fillClrLst meth="repeat">
+    <dgm:fillClrLst>
       <a:schemeClr val="accent2">
         <a:tint val="40000"/>
         <a:alpha val="90000"/>
@@ -4297,37 +4232,13 @@
         <a:tint val="40000"/>
         <a:alpha val="90000"/>
       </a:schemeClr>
-      <a:schemeClr val="accent4">
-        <a:tint val="40000"/>
-        <a:alpha val="90000"/>
-      </a:schemeClr>
-      <a:schemeClr val="accent5">
-        <a:tint val="40000"/>
-        <a:alpha val="90000"/>
-      </a:schemeClr>
-      <a:schemeClr val="accent6">
-        <a:tint val="40000"/>
-        <a:alpha val="90000"/>
-      </a:schemeClr>
     </dgm:fillClrLst>
-    <dgm:linClrLst meth="repeat">
+    <dgm:linClrLst>
       <a:schemeClr val="accent2">
         <a:tint val="40000"/>
         <a:alpha val="90000"/>
       </a:schemeClr>
       <a:schemeClr val="accent3">
-        <a:tint val="40000"/>
-        <a:alpha val="90000"/>
-      </a:schemeClr>
-      <a:schemeClr val="accent4">
-        <a:tint val="40000"/>
-        <a:alpha val="90000"/>
-      </a:schemeClr>
-      <a:schemeClr val="accent5">
-        <a:tint val="40000"/>
-        <a:alpha val="90000"/>
-      </a:schemeClr>
-      <a:schemeClr val="accent6">
         <a:tint val="40000"/>
         <a:alpha val="90000"/>
       </a:schemeClr>
@@ -4340,7 +4251,7 @@
     <dgm:txEffectClrLst/>
   </dgm:styleLbl>
   <dgm:styleLbl name="alignAccFollowNode1">
-    <dgm:fillClrLst meth="repeat">
+    <dgm:fillClrLst>
       <a:schemeClr val="accent2">
         <a:tint val="40000"/>
         <a:alpha val="90000"/>
@@ -4349,37 +4260,13 @@
         <a:tint val="40000"/>
         <a:alpha val="90000"/>
       </a:schemeClr>
-      <a:schemeClr val="accent4">
-        <a:tint val="40000"/>
-        <a:alpha val="90000"/>
-      </a:schemeClr>
-      <a:schemeClr val="accent5">
-        <a:tint val="40000"/>
-        <a:alpha val="90000"/>
-      </a:schemeClr>
-      <a:schemeClr val="accent6">
-        <a:tint val="40000"/>
-        <a:alpha val="90000"/>
-      </a:schemeClr>
     </dgm:fillClrLst>
-    <dgm:linClrLst meth="repeat">
+    <dgm:linClrLst>
       <a:schemeClr val="accent2">
         <a:tint val="40000"/>
         <a:alpha val="90000"/>
       </a:schemeClr>
       <a:schemeClr val="accent3">
-        <a:tint val="40000"/>
-        <a:alpha val="90000"/>
-      </a:schemeClr>
-      <a:schemeClr val="accent4">
-        <a:tint val="40000"/>
-        <a:alpha val="90000"/>
-      </a:schemeClr>
-      <a:schemeClr val="accent5">
-        <a:tint val="40000"/>
-        <a:alpha val="90000"/>
-      </a:schemeClr>
-      <a:schemeClr val="accent6">
         <a:tint val="40000"/>
         <a:alpha val="90000"/>
       </a:schemeClr>
@@ -4392,7 +4279,7 @@
     <dgm:txEffectClrLst/>
   </dgm:styleLbl>
   <dgm:styleLbl name="bgAccFollowNode1">
-    <dgm:fillClrLst meth="repeat">
+    <dgm:fillClrLst>
       <a:schemeClr val="accent2">
         <a:tint val="40000"/>
         <a:alpha val="90000"/>
@@ -4401,37 +4288,13 @@
         <a:tint val="40000"/>
         <a:alpha val="90000"/>
       </a:schemeClr>
-      <a:schemeClr val="accent4">
-        <a:tint val="40000"/>
-        <a:alpha val="90000"/>
-      </a:schemeClr>
-      <a:schemeClr val="accent5">
-        <a:tint val="40000"/>
-        <a:alpha val="90000"/>
-      </a:schemeClr>
-      <a:schemeClr val="accent6">
-        <a:tint val="40000"/>
-        <a:alpha val="90000"/>
-      </a:schemeClr>
     </dgm:fillClrLst>
-    <dgm:linClrLst meth="repeat">
+    <dgm:linClrLst>
       <a:schemeClr val="accent2">
         <a:tint val="40000"/>
         <a:alpha val="90000"/>
       </a:schemeClr>
       <a:schemeClr val="accent3">
-        <a:tint val="40000"/>
-        <a:alpha val="90000"/>
-      </a:schemeClr>
-      <a:schemeClr val="accent4">
-        <a:tint val="40000"/>
-        <a:alpha val="90000"/>
-      </a:schemeClr>
-      <a:schemeClr val="accent5">
-        <a:tint val="40000"/>
-        <a:alpha val="90000"/>
-      </a:schemeClr>
-      <a:schemeClr val="accent6">
         <a:tint val="40000"/>
         <a:alpha val="90000"/>
       </a:schemeClr>
@@ -4466,22 +4329,6 @@
       </a:schemeClr>
     </dgm:fillClrLst>
     <dgm:linClrLst>
-      <a:schemeClr val="accent2"/>
-    </dgm:linClrLst>
-    <dgm:effectClrLst/>
-    <dgm:txLinClrLst/>
-    <dgm:txFillClrLst meth="repeat">
-      <a:schemeClr val="dk1"/>
-    </dgm:txFillClrLst>
-    <dgm:txEffectClrLst/>
-  </dgm:styleLbl>
-  <dgm:styleLbl name="fgAcc3">
-    <dgm:fillClrLst meth="repeat">
-      <a:schemeClr val="lt1">
-        <a:alpha val="90000"/>
-      </a:schemeClr>
-    </dgm:fillClrLst>
-    <dgm:linClrLst>
       <a:schemeClr val="accent3"/>
     </dgm:linClrLst>
     <dgm:effectClrLst/>
@@ -4491,7 +4338,7 @@
     </dgm:txFillClrLst>
     <dgm:txEffectClrLst/>
   </dgm:styleLbl>
-  <dgm:styleLbl name="fgAcc4">
+  <dgm:styleLbl name="fgAcc3">
     <dgm:fillClrLst meth="repeat">
       <a:schemeClr val="lt1">
         <a:alpha val="90000"/>
@@ -4507,6 +4354,22 @@
     </dgm:txFillClrLst>
     <dgm:txEffectClrLst/>
   </dgm:styleLbl>
+  <dgm:styleLbl name="fgAcc4">
+    <dgm:fillClrLst meth="repeat">
+      <a:schemeClr val="lt1">
+        <a:alpha val="90000"/>
+      </a:schemeClr>
+    </dgm:fillClrLst>
+    <dgm:linClrLst>
+      <a:schemeClr val="accent5"/>
+    </dgm:linClrLst>
+    <dgm:effectClrLst/>
+    <dgm:txLinClrLst/>
+    <dgm:txFillClrLst meth="repeat">
+      <a:schemeClr val="dk1"/>
+    </dgm:txFillClrLst>
+    <dgm:txEffectClrLst/>
+  </dgm:styleLbl>
   <dgm:styleLbl name="bgShp">
     <dgm:fillClrLst meth="repeat">
       <a:schemeClr val="accent2">
@@ -4541,7 +4404,7 @@
   </dgm:styleLbl>
   <dgm:styleLbl name="trBgShp">
     <dgm:fillClrLst meth="repeat">
-      <a:schemeClr val="accent1">
+      <a:schemeClr val="accent2">
         <a:tint val="50000"/>
         <a:alpha val="40000"/>
       </a:schemeClr>
@@ -7478,7 +7341,7 @@
 <dgm:dataModel xmlns:dgm="http://schemas.openxmlformats.org/drawingml/2006/diagram" xmlns:a="http://schemas.openxmlformats.org/drawingml/2006/main">
   <dgm:ptLst>
     <dgm:pt modelId="{30762E71-10E3-47AA-B5F1-9814E3E3F9D1}" type="doc">
-      <dgm:prSet loTypeId="urn:microsoft.com/office/officeart/2005/8/layout/matrix3" loCatId="matrix" qsTypeId="urn:microsoft.com/office/officeart/2005/8/quickstyle/simple1" qsCatId="simple" csTypeId="urn:microsoft.com/office/officeart/2005/8/colors/colorful1" csCatId="colorful"/>
+      <dgm:prSet loTypeId="urn:microsoft.com/office/officeart/2005/8/layout/vList2" loCatId="list" qsTypeId="urn:microsoft.com/office/officeart/2005/8/quickstyle/simple1" qsCatId="simple" csTypeId="urn:microsoft.com/office/officeart/2005/8/colors/colorful2" csCatId="colorful"/>
       <dgm:spPr/>
       <dgm:t>
         <a:bodyPr/>
@@ -7495,6 +7358,11 @@
         <a:bodyPr/>
         <a:lstStyle/>
         <a:p>
+          <a:pPr>
+            <a:lnSpc>
+              <a:spcPct val="100000"/>
+            </a:lnSpc>
+          </a:pPr>
           <a:r>
             <a:rPr lang="en-US"/>
             <a:t>What pushed me technically?</a:t>
@@ -7531,6 +7399,11 @@
         <a:bodyPr/>
         <a:lstStyle/>
         <a:p>
+          <a:pPr>
+            <a:lnSpc>
+              <a:spcPct val="100000"/>
+            </a:lnSpc>
+          </a:pPr>
           <a:r>
             <a:rPr lang="en-US"/>
             <a:t>The fun part</a:t>
@@ -7567,8 +7440,13 @@
         <a:bodyPr/>
         <a:lstStyle/>
         <a:p>
+          <a:pPr>
+            <a:lnSpc>
+              <a:spcPct val="100000"/>
+            </a:lnSpc>
+          </a:pPr>
           <a:r>
-            <a:rPr lang="en-US"/>
+            <a:rPr lang="en-US" dirty="0"/>
             <a:t>The non-as-fun part</a:t>
           </a:r>
         </a:p>
@@ -7596,91 +7474,45 @@
         </a:p>
       </dgm:t>
     </dgm:pt>
-    <dgm:pt modelId="{E16202B1-7F6A-4C6C-AC7A-F317C59B5D2F}">
-      <dgm:prSet/>
-      <dgm:spPr/>
-      <dgm:t>
-        <a:bodyPr/>
-        <a:lstStyle/>
-        <a:p>
-          <a:r>
-            <a:rPr lang="en-US"/>
-            <a:t>Redesign ideas with more time</a:t>
-          </a:r>
-        </a:p>
-      </dgm:t>
-    </dgm:pt>
-    <dgm:pt modelId="{C5D3C204-272A-4BEB-A139-CAB6F1131726}" type="parTrans" cxnId="{8A9EA752-61A0-4F95-B797-A3E7114769F1}">
-      <dgm:prSet/>
-      <dgm:spPr/>
-      <dgm:t>
-        <a:bodyPr/>
-        <a:lstStyle/>
-        <a:p>
-          <a:endParaRPr lang="en-US"/>
-        </a:p>
-      </dgm:t>
-    </dgm:pt>
-    <dgm:pt modelId="{6808BEF4-A7C2-4518-9878-6636A812DC31}" type="sibTrans" cxnId="{8A9EA752-61A0-4F95-B797-A3E7114769F1}">
-      <dgm:prSet/>
-      <dgm:spPr/>
-      <dgm:t>
-        <a:bodyPr/>
-        <a:lstStyle/>
-        <a:p>
-          <a:endParaRPr lang="en-US"/>
-        </a:p>
-      </dgm:t>
-    </dgm:pt>
-    <dgm:pt modelId="{61F73646-8E6C-1A47-BB00-EB61457199B6}" type="pres">
-      <dgm:prSet presAssocID="{30762E71-10E3-47AA-B5F1-9814E3E3F9D1}" presName="matrix" presStyleCnt="0">
+    <dgm:pt modelId="{BE901F41-7F6E-0B45-ADF0-D3708C461DE0}" type="pres">
+      <dgm:prSet presAssocID="{30762E71-10E3-47AA-B5F1-9814E3E3F9D1}" presName="linear" presStyleCnt="0">
         <dgm:presLayoutVars>
-          <dgm:chMax val="1"/>
-          <dgm:dir/>
+          <dgm:animLvl val="lvl"/>
           <dgm:resizeHandles val="exact"/>
         </dgm:presLayoutVars>
       </dgm:prSet>
       <dgm:spPr/>
     </dgm:pt>
-    <dgm:pt modelId="{D9B51E99-B815-D648-AAFA-01BE4EB492AA}" type="pres">
-      <dgm:prSet presAssocID="{30762E71-10E3-47AA-B5F1-9814E3E3F9D1}" presName="diamond" presStyleLbl="bgShp" presStyleIdx="0" presStyleCnt="1"/>
-      <dgm:spPr/>
-    </dgm:pt>
-    <dgm:pt modelId="{50533055-B143-E942-B4A6-B86FC5C6B8DC}" type="pres">
-      <dgm:prSet presAssocID="{30762E71-10E3-47AA-B5F1-9814E3E3F9D1}" presName="quad1" presStyleLbl="node1" presStyleIdx="0" presStyleCnt="4">
+    <dgm:pt modelId="{0B93BB16-D311-7143-8576-F75CA6AD6B40}" type="pres">
+      <dgm:prSet presAssocID="{A8F78DC4-C99A-41A9-ABF9-FF9BC0126ED2}" presName="parentText" presStyleLbl="node1" presStyleIdx="0" presStyleCnt="3">
         <dgm:presLayoutVars>
           <dgm:chMax val="0"/>
-          <dgm:chPref val="0"/>
           <dgm:bulletEnabled val="1"/>
         </dgm:presLayoutVars>
       </dgm:prSet>
       <dgm:spPr/>
     </dgm:pt>
-    <dgm:pt modelId="{581A918B-519E-9A4B-A506-5258F890EA38}" type="pres">
-      <dgm:prSet presAssocID="{30762E71-10E3-47AA-B5F1-9814E3E3F9D1}" presName="quad2" presStyleLbl="node1" presStyleIdx="1" presStyleCnt="4">
+    <dgm:pt modelId="{89DF9F0C-A57A-9940-948A-2D5244727715}" type="pres">
+      <dgm:prSet presAssocID="{8FF69DFA-EF6B-48E5-8E49-68B1AFF2CD37}" presName="spacer" presStyleCnt="0"/>
+      <dgm:spPr/>
+    </dgm:pt>
+    <dgm:pt modelId="{4226EF11-1517-294E-9AA2-85845A0B0016}" type="pres">
+      <dgm:prSet presAssocID="{96086DEA-7E4A-4670-A46F-E0E72BACBFED}" presName="parentText" presStyleLbl="node1" presStyleIdx="1" presStyleCnt="3">
         <dgm:presLayoutVars>
           <dgm:chMax val="0"/>
-          <dgm:chPref val="0"/>
           <dgm:bulletEnabled val="1"/>
         </dgm:presLayoutVars>
       </dgm:prSet>
       <dgm:spPr/>
     </dgm:pt>
-    <dgm:pt modelId="{D574D559-302D-F64C-9BFF-2648E0D7DE7E}" type="pres">
-      <dgm:prSet presAssocID="{30762E71-10E3-47AA-B5F1-9814E3E3F9D1}" presName="quad3" presStyleLbl="node1" presStyleIdx="2" presStyleCnt="4">
+    <dgm:pt modelId="{3705CD74-3098-DE4D-B80C-E3D795120283}" type="pres">
+      <dgm:prSet presAssocID="{7AF2D683-2EDC-43A9-9A02-356E6C96039C}" presName="spacer" presStyleCnt="0"/>
+      <dgm:spPr/>
+    </dgm:pt>
+    <dgm:pt modelId="{A682B093-B82C-FA40-8AFE-D10F170274F5}" type="pres">
+      <dgm:prSet presAssocID="{7152E45D-9EBE-4568-A242-B468D23A080D}" presName="parentText" presStyleLbl="node1" presStyleIdx="2" presStyleCnt="3">
         <dgm:presLayoutVars>
           <dgm:chMax val="0"/>
-          <dgm:chPref val="0"/>
-          <dgm:bulletEnabled val="1"/>
-        </dgm:presLayoutVars>
-      </dgm:prSet>
-      <dgm:spPr/>
-    </dgm:pt>
-    <dgm:pt modelId="{21BC2C1C-9BF9-5E4A-8C95-D9CB75C36666}" type="pres">
-      <dgm:prSet presAssocID="{30762E71-10E3-47AA-B5F1-9814E3E3F9D1}" presName="quad4" presStyleLbl="node1" presStyleIdx="3" presStyleCnt="4">
-        <dgm:presLayoutVars>
-          <dgm:chMax val="0"/>
-          <dgm:chPref val="0"/>
           <dgm:bulletEnabled val="1"/>
         </dgm:presLayoutVars>
       </dgm:prSet>
@@ -7688,20 +7520,18 @@
     </dgm:pt>
   </dgm:ptLst>
   <dgm:cxnLst>
-    <dgm:cxn modelId="{04989D18-AC8B-934A-A454-45E23ACF01FD}" type="presOf" srcId="{7152E45D-9EBE-4568-A242-B468D23A080D}" destId="{D574D559-302D-F64C-9BFF-2648E0D7DE7E}" srcOrd="0" destOrd="0" presId="urn:microsoft.com/office/officeart/2005/8/layout/matrix3"/>
-    <dgm:cxn modelId="{AC26AD38-5661-A44A-AD8B-40FF6440BA9C}" type="presOf" srcId="{96086DEA-7E4A-4670-A46F-E0E72BACBFED}" destId="{581A918B-519E-9A4B-A506-5258F890EA38}" srcOrd="0" destOrd="0" presId="urn:microsoft.com/office/officeart/2005/8/layout/matrix3"/>
-    <dgm:cxn modelId="{D6399A48-6F8E-1A45-A9B4-07210AEFDF64}" type="presOf" srcId="{A8F78DC4-C99A-41A9-ABF9-FF9BC0126ED2}" destId="{50533055-B143-E942-B4A6-B86FC5C6B8DC}" srcOrd="0" destOrd="0" presId="urn:microsoft.com/office/officeart/2005/8/layout/matrix3"/>
-    <dgm:cxn modelId="{8A9EA752-61A0-4F95-B797-A3E7114769F1}" srcId="{30762E71-10E3-47AA-B5F1-9814E3E3F9D1}" destId="{E16202B1-7F6A-4C6C-AC7A-F317C59B5D2F}" srcOrd="3" destOrd="0" parTransId="{C5D3C204-272A-4BEB-A139-CAB6F1131726}" sibTransId="{6808BEF4-A7C2-4518-9878-6636A812DC31}"/>
-    <dgm:cxn modelId="{F82EAE62-3BC6-E34B-9DAC-E96074020731}" type="presOf" srcId="{30762E71-10E3-47AA-B5F1-9814E3E3F9D1}" destId="{61F73646-8E6C-1A47-BB00-EB61457199B6}" srcOrd="0" destOrd="0" presId="urn:microsoft.com/office/officeart/2005/8/layout/matrix3"/>
+    <dgm:cxn modelId="{9159CD21-9553-DC42-84BA-9065C5C79C38}" type="presOf" srcId="{30762E71-10E3-47AA-B5F1-9814E3E3F9D1}" destId="{BE901F41-7F6E-0B45-ADF0-D3708C461DE0}" srcOrd="0" destOrd="0" presId="urn:microsoft.com/office/officeart/2005/8/layout/vList2"/>
+    <dgm:cxn modelId="{45B93E7A-2918-BF47-BE8D-2C74DEEA20C5}" type="presOf" srcId="{96086DEA-7E4A-4670-A46F-E0E72BACBFED}" destId="{4226EF11-1517-294E-9AA2-85845A0B0016}" srcOrd="0" destOrd="0" presId="urn:microsoft.com/office/officeart/2005/8/layout/vList2"/>
+    <dgm:cxn modelId="{85D55D7F-2860-8D4A-856C-1A965C7ADAC5}" type="presOf" srcId="{7152E45D-9EBE-4568-A242-B468D23A080D}" destId="{A682B093-B82C-FA40-8AFE-D10F170274F5}" srcOrd="0" destOrd="0" presId="urn:microsoft.com/office/officeart/2005/8/layout/vList2"/>
     <dgm:cxn modelId="{C61F5C8A-F5DE-4DB0-A644-DBB835135C1C}" srcId="{30762E71-10E3-47AA-B5F1-9814E3E3F9D1}" destId="{96086DEA-7E4A-4670-A46F-E0E72BACBFED}" srcOrd="1" destOrd="0" parTransId="{AD3D6026-81DC-4F68-A315-D44A8736655D}" sibTransId="{7AF2D683-2EDC-43A9-9A02-356E6C96039C}"/>
-    <dgm:cxn modelId="{95B923BC-626B-9F4A-8211-186082C3A854}" type="presOf" srcId="{E16202B1-7F6A-4C6C-AC7A-F317C59B5D2F}" destId="{21BC2C1C-9BF9-5E4A-8C95-D9CB75C36666}" srcOrd="0" destOrd="0" presId="urn:microsoft.com/office/officeart/2005/8/layout/matrix3"/>
+    <dgm:cxn modelId="{2414A4E4-C978-7D49-8841-54D037685C7E}" type="presOf" srcId="{A8F78DC4-C99A-41A9-ABF9-FF9BC0126ED2}" destId="{0B93BB16-D311-7143-8576-F75CA6AD6B40}" srcOrd="0" destOrd="0" presId="urn:microsoft.com/office/officeart/2005/8/layout/vList2"/>
     <dgm:cxn modelId="{285B98E5-D869-4525-B21A-526400140662}" srcId="{30762E71-10E3-47AA-B5F1-9814E3E3F9D1}" destId="{7152E45D-9EBE-4568-A242-B468D23A080D}" srcOrd="2" destOrd="0" parTransId="{65FEB7D6-0931-4049-A25B-E56428C1D810}" sibTransId="{98957725-7EF1-4A89-8EC3-E360C8E2F45E}"/>
     <dgm:cxn modelId="{FF8465FE-473C-432B-ADFE-849EC20601CF}" srcId="{30762E71-10E3-47AA-B5F1-9814E3E3F9D1}" destId="{A8F78DC4-C99A-41A9-ABF9-FF9BC0126ED2}" srcOrd="0" destOrd="0" parTransId="{C68FB33B-4D49-484D-94D1-6FEF43BE5640}" sibTransId="{8FF69DFA-EF6B-48E5-8E49-68B1AFF2CD37}"/>
-    <dgm:cxn modelId="{B1AF0F4E-3AE5-484F-9817-973240DBF549}" type="presParOf" srcId="{61F73646-8E6C-1A47-BB00-EB61457199B6}" destId="{D9B51E99-B815-D648-AAFA-01BE4EB492AA}" srcOrd="0" destOrd="0" presId="urn:microsoft.com/office/officeart/2005/8/layout/matrix3"/>
-    <dgm:cxn modelId="{51C5379A-0C25-8743-BD9F-094DDEC69FFB}" type="presParOf" srcId="{61F73646-8E6C-1A47-BB00-EB61457199B6}" destId="{50533055-B143-E942-B4A6-B86FC5C6B8DC}" srcOrd="1" destOrd="0" presId="urn:microsoft.com/office/officeart/2005/8/layout/matrix3"/>
-    <dgm:cxn modelId="{44D95882-ACE6-1C42-9015-8632714E569B}" type="presParOf" srcId="{61F73646-8E6C-1A47-BB00-EB61457199B6}" destId="{581A918B-519E-9A4B-A506-5258F890EA38}" srcOrd="2" destOrd="0" presId="urn:microsoft.com/office/officeart/2005/8/layout/matrix3"/>
-    <dgm:cxn modelId="{C0E070D5-35E2-9E47-9EEC-80E64D898467}" type="presParOf" srcId="{61F73646-8E6C-1A47-BB00-EB61457199B6}" destId="{D574D559-302D-F64C-9BFF-2648E0D7DE7E}" srcOrd="3" destOrd="0" presId="urn:microsoft.com/office/officeart/2005/8/layout/matrix3"/>
-    <dgm:cxn modelId="{5CBAFF16-DF16-E045-9F9B-D45FD7B52ED6}" type="presParOf" srcId="{61F73646-8E6C-1A47-BB00-EB61457199B6}" destId="{21BC2C1C-9BF9-5E4A-8C95-D9CB75C36666}" srcOrd="4" destOrd="0" presId="urn:microsoft.com/office/officeart/2005/8/layout/matrix3"/>
+    <dgm:cxn modelId="{48AB70B1-5A55-1A48-BFCE-0DF6AEB53A25}" type="presParOf" srcId="{BE901F41-7F6E-0B45-ADF0-D3708C461DE0}" destId="{0B93BB16-D311-7143-8576-F75CA6AD6B40}" srcOrd="0" destOrd="0" presId="urn:microsoft.com/office/officeart/2005/8/layout/vList2"/>
+    <dgm:cxn modelId="{5087B0F9-FF67-4A4A-B696-B7BD6D1B8117}" type="presParOf" srcId="{BE901F41-7F6E-0B45-ADF0-D3708C461DE0}" destId="{89DF9F0C-A57A-9940-948A-2D5244727715}" srcOrd="1" destOrd="0" presId="urn:microsoft.com/office/officeart/2005/8/layout/vList2"/>
+    <dgm:cxn modelId="{7D81C84A-C649-9E4F-A0EF-BFD8C05B7529}" type="presParOf" srcId="{BE901F41-7F6E-0B45-ADF0-D3708C461DE0}" destId="{4226EF11-1517-294E-9AA2-85845A0B0016}" srcOrd="2" destOrd="0" presId="urn:microsoft.com/office/officeart/2005/8/layout/vList2"/>
+    <dgm:cxn modelId="{FF579AFA-D48D-2744-8E62-7A845BB3817D}" type="presParOf" srcId="{BE901F41-7F6E-0B45-ADF0-D3708C461DE0}" destId="{3705CD74-3098-DE4D-B80C-E3D795120283}" srcOrd="3" destOrd="0" presId="urn:microsoft.com/office/officeart/2005/8/layout/vList2"/>
+    <dgm:cxn modelId="{E801A3F3-E1FA-DB45-965B-A09AF902F760}" type="presParOf" srcId="{BE901F41-7F6E-0B45-ADF0-D3708C461DE0}" destId="{A682B093-B82C-FA40-8AFE-D10F170274F5}" srcOrd="4" destOrd="0" presId="urn:microsoft.com/office/officeart/2005/8/layout/vList2"/>
   </dgm:cxnLst>
   <dgm:bg/>
   <dgm:whole/>
@@ -10322,55 +10152,15 @@
       <dsp:cNvGrpSpPr/>
     </dsp:nvGrpSpPr>
     <dsp:grpSpPr/>
-    <dsp:sp modelId="{D9B51E99-B815-D648-AAFA-01BE4EB492AA}">
+    <dsp:sp modelId="{0B93BB16-D311-7143-8576-F75CA6AD6B40}">
       <dsp:nvSpPr>
         <dsp:cNvPr id="0" name=""/>
         <dsp:cNvSpPr/>
       </dsp:nvSpPr>
       <dsp:spPr>
         <a:xfrm>
-          <a:off x="635507" y="0"/>
-          <a:ext cx="5541264" cy="5541264"/>
-        </a:xfrm>
-        <a:prstGeom prst="diamond">
-          <a:avLst/>
-        </a:prstGeom>
-        <a:solidFill>
-          <a:schemeClr val="accent2">
-            <a:tint val="40000"/>
-            <a:hueOff val="0"/>
-            <a:satOff val="0"/>
-            <a:lumOff val="0"/>
-            <a:alphaOff val="0"/>
-          </a:schemeClr>
-        </a:solidFill>
-        <a:ln>
-          <a:noFill/>
-        </a:ln>
-        <a:effectLst/>
-      </dsp:spPr>
-      <dsp:style>
-        <a:lnRef idx="0">
-          <a:scrgbClr r="0" g="0" b="0"/>
-        </a:lnRef>
-        <a:fillRef idx="1">
-          <a:scrgbClr r="0" g="0" b="0"/>
-        </a:fillRef>
-        <a:effectRef idx="0">
-          <a:scrgbClr r="0" g="0" b="0"/>
-        </a:effectRef>
-        <a:fontRef idx="minor"/>
-      </dsp:style>
-    </dsp:sp>
-    <dsp:sp modelId="{50533055-B143-E942-B4A6-B86FC5C6B8DC}">
-      <dsp:nvSpPr>
-        <dsp:cNvPr id="0" name=""/>
-        <dsp:cNvSpPr/>
-      </dsp:nvSpPr>
-      <dsp:spPr>
-        <a:xfrm>
-          <a:off x="1161928" y="526420"/>
-          <a:ext cx="2161092" cy="2161092"/>
+          <a:off x="0" y="8505"/>
+          <a:ext cx="6967728" cy="1774890"/>
         </a:xfrm>
         <a:prstGeom prst="roundRect">
           <a:avLst/>
@@ -10412,14 +10202,14 @@
         </a:fontRef>
       </dsp:style>
       <dsp:txBody>
-        <a:bodyPr spcFirstLastPara="0" vert="horz" wrap="square" lIns="95250" tIns="95250" rIns="95250" bIns="95250" numCol="1" spcCol="1270" anchor="ctr" anchorCtr="0">
+        <a:bodyPr spcFirstLastPara="0" vert="horz" wrap="square" lIns="156210" tIns="156210" rIns="156210" bIns="156210" numCol="1" spcCol="1270" anchor="ctr" anchorCtr="0">
           <a:noAutofit/>
         </a:bodyPr>
         <a:lstStyle/>
         <a:p>
-          <a:pPr marL="0" lvl="0" indent="0" algn="ctr" defTabSz="1111250">
+          <a:pPr marL="0" lvl="0" indent="0" algn="l" defTabSz="1822450">
             <a:lnSpc>
-              <a:spcPct val="90000"/>
+              <a:spcPct val="100000"/>
             </a:lnSpc>
             <a:spcBef>
               <a:spcPct val="0"/>
@@ -10430,34 +10220,34 @@
             <a:buNone/>
           </a:pPr>
           <a:r>
-            <a:rPr lang="en-US" sz="2500" kern="1200"/>
+            <a:rPr lang="en-US" sz="4100" kern="1200"/>
             <a:t>What pushed me technically?</a:t>
           </a:r>
         </a:p>
       </dsp:txBody>
       <dsp:txXfrm>
-        <a:off x="1267424" y="631916"/>
-        <a:ext cx="1950100" cy="1950100"/>
+        <a:off x="86643" y="95148"/>
+        <a:ext cx="6794442" cy="1601604"/>
       </dsp:txXfrm>
     </dsp:sp>
-    <dsp:sp modelId="{581A918B-519E-9A4B-A506-5258F890EA38}">
+    <dsp:sp modelId="{4226EF11-1517-294E-9AA2-85845A0B0016}">
       <dsp:nvSpPr>
         <dsp:cNvPr id="0" name=""/>
         <dsp:cNvSpPr/>
       </dsp:nvSpPr>
       <dsp:spPr>
         <a:xfrm>
-          <a:off x="3489258" y="526420"/>
-          <a:ext cx="2161092" cy="2161092"/>
+          <a:off x="0" y="1901475"/>
+          <a:ext cx="6967728" cy="1774890"/>
         </a:xfrm>
         <a:prstGeom prst="roundRect">
           <a:avLst/>
         </a:prstGeom>
         <a:solidFill>
-          <a:schemeClr val="accent3">
-            <a:hueOff val="0"/>
-            <a:satOff val="0"/>
-            <a:lumOff val="0"/>
+          <a:schemeClr val="accent2">
+            <a:hueOff val="-1224775"/>
+            <a:satOff val="-5657"/>
+            <a:lumOff val="-1177"/>
             <a:alphaOff val="0"/>
           </a:schemeClr>
         </a:solidFill>
@@ -10490,14 +10280,14 @@
         </a:fontRef>
       </dsp:style>
       <dsp:txBody>
-        <a:bodyPr spcFirstLastPara="0" vert="horz" wrap="square" lIns="95250" tIns="95250" rIns="95250" bIns="95250" numCol="1" spcCol="1270" anchor="ctr" anchorCtr="0">
+        <a:bodyPr spcFirstLastPara="0" vert="horz" wrap="square" lIns="156210" tIns="156210" rIns="156210" bIns="156210" numCol="1" spcCol="1270" anchor="ctr" anchorCtr="0">
           <a:noAutofit/>
         </a:bodyPr>
         <a:lstStyle/>
         <a:p>
-          <a:pPr marL="0" lvl="0" indent="0" algn="ctr" defTabSz="1111250">
+          <a:pPr marL="0" lvl="0" indent="0" algn="l" defTabSz="1822450">
             <a:lnSpc>
-              <a:spcPct val="90000"/>
+              <a:spcPct val="100000"/>
             </a:lnSpc>
             <a:spcBef>
               <a:spcPct val="0"/>
@@ -10508,34 +10298,34 @@
             <a:buNone/>
           </a:pPr>
           <a:r>
-            <a:rPr lang="en-US" sz="2500" kern="1200"/>
+            <a:rPr lang="en-US" sz="4100" kern="1200"/>
             <a:t>The fun part</a:t>
           </a:r>
         </a:p>
       </dsp:txBody>
       <dsp:txXfrm>
-        <a:off x="3594754" y="631916"/>
-        <a:ext cx="1950100" cy="1950100"/>
+        <a:off x="86643" y="1988118"/>
+        <a:ext cx="6794442" cy="1601604"/>
       </dsp:txXfrm>
     </dsp:sp>
-    <dsp:sp modelId="{D574D559-302D-F64C-9BFF-2648E0D7DE7E}">
+    <dsp:sp modelId="{A682B093-B82C-FA40-8AFE-D10F170274F5}">
       <dsp:nvSpPr>
         <dsp:cNvPr id="0" name=""/>
         <dsp:cNvSpPr/>
       </dsp:nvSpPr>
       <dsp:spPr>
         <a:xfrm>
-          <a:off x="1161928" y="2853750"/>
-          <a:ext cx="2161092" cy="2161092"/>
+          <a:off x="0" y="3794445"/>
+          <a:ext cx="6967728" cy="1774890"/>
         </a:xfrm>
         <a:prstGeom prst="roundRect">
           <a:avLst/>
         </a:prstGeom>
         <a:solidFill>
-          <a:schemeClr val="accent4">
-            <a:hueOff val="0"/>
-            <a:satOff val="0"/>
-            <a:lumOff val="0"/>
+          <a:schemeClr val="accent2">
+            <a:hueOff val="-2449550"/>
+            <a:satOff val="-11314"/>
+            <a:lumOff val="-2354"/>
             <a:alphaOff val="0"/>
           </a:schemeClr>
         </a:solidFill>
@@ -10568,14 +10358,14 @@
         </a:fontRef>
       </dsp:style>
       <dsp:txBody>
-        <a:bodyPr spcFirstLastPara="0" vert="horz" wrap="square" lIns="95250" tIns="95250" rIns="95250" bIns="95250" numCol="1" spcCol="1270" anchor="ctr" anchorCtr="0">
+        <a:bodyPr spcFirstLastPara="0" vert="horz" wrap="square" lIns="156210" tIns="156210" rIns="156210" bIns="156210" numCol="1" spcCol="1270" anchor="ctr" anchorCtr="0">
           <a:noAutofit/>
         </a:bodyPr>
         <a:lstStyle/>
         <a:p>
-          <a:pPr marL="0" lvl="0" indent="0" algn="ctr" defTabSz="1111250">
+          <a:pPr marL="0" lvl="0" indent="0" algn="l" defTabSz="1822450">
             <a:lnSpc>
-              <a:spcPct val="90000"/>
+              <a:spcPct val="100000"/>
             </a:lnSpc>
             <a:spcBef>
               <a:spcPct val="0"/>
@@ -10586,92 +10376,14 @@
             <a:buNone/>
           </a:pPr>
           <a:r>
-            <a:rPr lang="en-US" sz="2500" kern="1200"/>
+            <a:rPr lang="en-US" sz="4100" kern="1200" dirty="0"/>
             <a:t>The non-as-fun part</a:t>
           </a:r>
         </a:p>
       </dsp:txBody>
       <dsp:txXfrm>
-        <a:off x="1267424" y="2959246"/>
-        <a:ext cx="1950100" cy="1950100"/>
-      </dsp:txXfrm>
-    </dsp:sp>
-    <dsp:sp modelId="{21BC2C1C-9BF9-5E4A-8C95-D9CB75C36666}">
-      <dsp:nvSpPr>
-        <dsp:cNvPr id="0" name=""/>
-        <dsp:cNvSpPr/>
-      </dsp:nvSpPr>
-      <dsp:spPr>
-        <a:xfrm>
-          <a:off x="3489258" y="2853750"/>
-          <a:ext cx="2161092" cy="2161092"/>
-        </a:xfrm>
-        <a:prstGeom prst="roundRect">
-          <a:avLst/>
-        </a:prstGeom>
-        <a:solidFill>
-          <a:schemeClr val="accent5">
-            <a:hueOff val="0"/>
-            <a:satOff val="0"/>
-            <a:lumOff val="0"/>
-            <a:alphaOff val="0"/>
-          </a:schemeClr>
-        </a:solidFill>
-        <a:ln w="12700" cap="flat" cmpd="sng" algn="ctr">
-          <a:solidFill>
-            <a:schemeClr val="lt1">
-              <a:hueOff val="0"/>
-              <a:satOff val="0"/>
-              <a:lumOff val="0"/>
-              <a:alphaOff val="0"/>
-            </a:schemeClr>
-          </a:solidFill>
-          <a:prstDash val="solid"/>
-          <a:miter lim="800000"/>
-        </a:ln>
-        <a:effectLst/>
-      </dsp:spPr>
-      <dsp:style>
-        <a:lnRef idx="2">
-          <a:scrgbClr r="0" g="0" b="0"/>
-        </a:lnRef>
-        <a:fillRef idx="1">
-          <a:scrgbClr r="0" g="0" b="0"/>
-        </a:fillRef>
-        <a:effectRef idx="0">
-          <a:scrgbClr r="0" g="0" b="0"/>
-        </a:effectRef>
-        <a:fontRef idx="minor">
-          <a:schemeClr val="lt1"/>
-        </a:fontRef>
-      </dsp:style>
-      <dsp:txBody>
-        <a:bodyPr spcFirstLastPara="0" vert="horz" wrap="square" lIns="95250" tIns="95250" rIns="95250" bIns="95250" numCol="1" spcCol="1270" anchor="ctr" anchorCtr="0">
-          <a:noAutofit/>
-        </a:bodyPr>
-        <a:lstStyle/>
-        <a:p>
-          <a:pPr marL="0" lvl="0" indent="0" algn="ctr" defTabSz="1111250">
-            <a:lnSpc>
-              <a:spcPct val="90000"/>
-            </a:lnSpc>
-            <a:spcBef>
-              <a:spcPct val="0"/>
-            </a:spcBef>
-            <a:spcAft>
-              <a:spcPct val="35000"/>
-            </a:spcAft>
-            <a:buNone/>
-          </a:pPr>
-          <a:r>
-            <a:rPr lang="en-US" sz="2500" kern="1200"/>
-            <a:t>Redesign ideas with more time</a:t>
-          </a:r>
-        </a:p>
-      </dsp:txBody>
-      <dsp:txXfrm>
-        <a:off x="3594754" y="2959246"/>
-        <a:ext cx="1950100" cy="1950100"/>
+        <a:off x="86643" y="3881088"/>
+        <a:ext cx="6794442" cy="1601604"/>
       </dsp:txXfrm>
     </dsp:sp>
   </dsp:spTree>
@@ -11969,12 +11681,12 @@
 </file>
 
 <file path=ppt/diagrams/layout5.xml><?xml version="1.0" encoding="utf-8"?>
-<dgm:layoutDef xmlns:dgm="http://schemas.openxmlformats.org/drawingml/2006/diagram" xmlns:a="http://schemas.openxmlformats.org/drawingml/2006/main" uniqueId="urn:microsoft.com/office/officeart/2005/8/layout/matrix3">
+<dgm:layoutDef xmlns:dgm="http://schemas.openxmlformats.org/drawingml/2006/diagram" xmlns:a="http://schemas.openxmlformats.org/drawingml/2006/main" uniqueId="urn:microsoft.com/office/officeart/2005/8/layout/vList2">
   <dgm:title val=""/>
   <dgm:desc val=""/>
   <dgm:catLst>
-    <dgm:cat type="matrix" pri="1000"/>
-    <dgm:cat type="convert" pri="18000"/>
+    <dgm:cat type="list" pri="3000"/>
+    <dgm:cat type="convert" pri="1000"/>
   </dgm:catLst>
   <dgm:sampData>
     <dgm:dataModel>
@@ -11983,206 +11695,154 @@
         <dgm:pt modelId="1">
           <dgm:prSet phldr="1"/>
         </dgm:pt>
+        <dgm:pt modelId="11">
+          <dgm:prSet phldr="1"/>
+        </dgm:pt>
         <dgm:pt modelId="2">
           <dgm:prSet phldr="1"/>
         </dgm:pt>
-        <dgm:pt modelId="3">
-          <dgm:prSet phldr="1"/>
-        </dgm:pt>
-        <dgm:pt modelId="4">
+        <dgm:pt modelId="21">
           <dgm:prSet phldr="1"/>
         </dgm:pt>
       </dgm:ptLst>
       <dgm:cxnLst>
-        <dgm:cxn modelId="5" srcId="0" destId="1" srcOrd="0" destOrd="0"/>
-        <dgm:cxn modelId="6" srcId="0" destId="2" srcOrd="1" destOrd="0"/>
-        <dgm:cxn modelId="7" srcId="0" destId="3" srcOrd="0" destOrd="0"/>
-        <dgm:cxn modelId="8" srcId="0" destId="4" srcOrd="1" destOrd="0"/>
+        <dgm:cxn modelId="4" srcId="0" destId="1" srcOrd="0" destOrd="0"/>
+        <dgm:cxn modelId="5" srcId="0" destId="2" srcOrd="1" destOrd="0"/>
+        <dgm:cxn modelId="12" srcId="1" destId="11" srcOrd="0" destOrd="0"/>
+        <dgm:cxn modelId="23" srcId="2" destId="21" srcOrd="0" destOrd="0"/>
       </dgm:cxnLst>
       <dgm:bg/>
       <dgm:whole/>
     </dgm:dataModel>
   </dgm:sampData>
-  <dgm:styleData useDef="1">
+  <dgm:styleData>
     <dgm:dataModel>
-      <dgm:ptLst/>
+      <dgm:ptLst>
+        <dgm:pt modelId="0" type="doc"/>
+        <dgm:pt modelId="1"/>
+        <dgm:pt modelId="2"/>
+      </dgm:ptLst>
+      <dgm:cxnLst>
+        <dgm:cxn modelId="3" srcId="0" destId="1" srcOrd="0" destOrd="0"/>
+        <dgm:cxn modelId="4" srcId="0" destId="2" srcOrd="1" destOrd="0"/>
+      </dgm:cxnLst>
       <dgm:bg/>
       <dgm:whole/>
     </dgm:dataModel>
   </dgm:styleData>
-  <dgm:clrData useDef="1">
+  <dgm:clrData>
     <dgm:dataModel>
-      <dgm:ptLst/>
+      <dgm:ptLst>
+        <dgm:pt modelId="0" type="doc"/>
+        <dgm:pt modelId="1"/>
+        <dgm:pt modelId="2"/>
+        <dgm:pt modelId="3"/>
+        <dgm:pt modelId="4"/>
+      </dgm:ptLst>
+      <dgm:cxnLst>
+        <dgm:cxn modelId="5" srcId="0" destId="1" srcOrd="0" destOrd="0"/>
+        <dgm:cxn modelId="6" srcId="0" destId="2" srcOrd="1" destOrd="0"/>
+        <dgm:cxn modelId="7" srcId="0" destId="3" srcOrd="2" destOrd="0"/>
+        <dgm:cxn modelId="8" srcId="0" destId="4" srcOrd="3" destOrd="0"/>
+      </dgm:cxnLst>
       <dgm:bg/>
       <dgm:whole/>
     </dgm:dataModel>
   </dgm:clrData>
-  <dgm:layoutNode name="matrix">
+  <dgm:layoutNode name="linear">
     <dgm:varLst>
-      <dgm:chMax val="1"/>
-      <dgm:dir/>
+      <dgm:animLvl val="lvl"/>
       <dgm:resizeHandles val="exact"/>
     </dgm:varLst>
-    <dgm:alg type="composite">
-      <dgm:param type="ar" val="1"/>
+    <dgm:alg type="lin">
+      <dgm:param type="linDir" val="fromT"/>
+      <dgm:param type="vertAlign" val="mid"/>
     </dgm:alg>
     <dgm:shape xmlns:r="http://schemas.openxmlformats.org/officeDocument/2006/relationships" r:blip="">
       <dgm:adjLst/>
     </dgm:shape>
     <dgm:presOf/>
-    <dgm:choose name="Name0">
-      <dgm:if name="Name1" func="var" arg="dir" op="equ" val="norm">
+    <dgm:constrLst>
+      <dgm:constr type="w" for="ch" forName="parentText" refType="w"/>
+      <dgm:constr type="h" for="ch" forName="parentText" refType="primFontSz" refFor="ch" refForName="parentText" fact="0.52"/>
+      <dgm:constr type="w" for="ch" forName="childText" refType="w"/>
+      <dgm:constr type="h" for="ch" forName="childText" refType="primFontSz" refFor="ch" refForName="parentText" fact="0.46"/>
+      <dgm:constr type="h" for="ch" forName="parentText" op="equ"/>
+      <dgm:constr type="primFontSz" for="ch" forName="parentText" op="equ" val="65"/>
+      <dgm:constr type="primFontSz" for="ch" forName="childText" refType="primFontSz" refFor="ch" refForName="parentText" op="equ"/>
+      <dgm:constr type="h" for="ch" forName="spacer" refType="primFontSz" refFor="ch" refForName="parentText" fact="0.08"/>
+    </dgm:constrLst>
+    <dgm:ruleLst>
+      <dgm:rule type="primFontSz" for="ch" forName="parentText" val="5" fact="NaN" max="NaN"/>
+    </dgm:ruleLst>
+    <dgm:forEach name="Name0" axis="ch" ptType="node">
+      <dgm:layoutNode name="parentText" styleLbl="node1">
+        <dgm:varLst>
+          <dgm:chMax val="0"/>
+          <dgm:bulletEnabled val="1"/>
+        </dgm:varLst>
+        <dgm:alg type="tx">
+          <dgm:param type="parTxLTRAlign" val="l"/>
+          <dgm:param type="parTxRTLAlign" val="r"/>
+        </dgm:alg>
+        <dgm:shape xmlns:r="http://schemas.openxmlformats.org/officeDocument/2006/relationships" type="roundRect" r:blip="">
+          <dgm:adjLst/>
+        </dgm:shape>
+        <dgm:presOf axis="self"/>
         <dgm:constrLst>
-          <dgm:constr type="w" for="ch" forName="diamond" refType="w"/>
-          <dgm:constr type="h" for="ch" forName="diamond" refType="h"/>
-          <dgm:constr type="w" for="ch" forName="quad1" refType="w" fact="0.39"/>
-          <dgm:constr type="h" for="ch" forName="quad1" refType="h" fact="0.39"/>
-          <dgm:constr type="ctrX" for="ch" forName="quad1" refType="w" fact="0.29"/>
-          <dgm:constr type="ctrY" for="ch" forName="quad1" refType="h" fact="0.29"/>
-          <dgm:constr type="w" for="ch" forName="quad2" refType="w" fact="0.39"/>
-          <dgm:constr type="h" for="ch" forName="quad2" refType="h" fact="0.39"/>
-          <dgm:constr type="ctrX" for="ch" forName="quad2" refType="w" fact="0.71"/>
-          <dgm:constr type="ctrY" for="ch" forName="quad2" refType="h" fact="0.29"/>
-          <dgm:constr type="w" for="ch" forName="quad3" refType="w" fact="0.39"/>
-          <dgm:constr type="h" for="ch" forName="quad3" refType="h" fact="0.39"/>
-          <dgm:constr type="ctrX" for="ch" forName="quad3" refType="w" fact="0.29"/>
-          <dgm:constr type="ctrY" for="ch" forName="quad3" refType="h" fact="0.71"/>
-          <dgm:constr type="w" for="ch" forName="quad4" refType="w" fact="0.39"/>
-          <dgm:constr type="h" for="ch" forName="quad4" refType="h" fact="0.39"/>
-          <dgm:constr type="ctrX" for="ch" forName="quad4" refType="w" fact="0.71"/>
-          <dgm:constr type="ctrY" for="ch" forName="quad4" refType="h" fact="0.71"/>
-          <dgm:constr type="primFontSz" for="des" ptType="node" op="equ" val="65"/>
+          <dgm:constr type="tMarg" refType="primFontSz" fact="0.3"/>
+          <dgm:constr type="bMarg" refType="primFontSz" fact="0.3"/>
+          <dgm:constr type="lMarg" refType="primFontSz" fact="0.3"/>
+          <dgm:constr type="rMarg" refType="primFontSz" fact="0.3"/>
         </dgm:constrLst>
-      </dgm:if>
-      <dgm:else name="Name2">
-        <dgm:constrLst>
-          <dgm:constr type="w" for="ch" forName="diamond" refType="w"/>
-          <dgm:constr type="h" for="ch" forName="diamond" refType="h"/>
-          <dgm:constr type="w" for="ch" forName="quad1" refType="w" fact="0.39"/>
-          <dgm:constr type="h" for="ch" forName="quad1" refType="h" fact="0.39"/>
-          <dgm:constr type="ctrX" for="ch" forName="quad1" refType="w" fact="0.71"/>
-          <dgm:constr type="ctrY" for="ch" forName="quad1" refType="h" fact="0.29"/>
-          <dgm:constr type="w" for="ch" forName="quad2" refType="w" fact="0.39"/>
-          <dgm:constr type="h" for="ch" forName="quad2" refType="h" fact="0.39"/>
-          <dgm:constr type="ctrX" for="ch" forName="quad2" refType="w" fact="0.29"/>
-          <dgm:constr type="ctrY" for="ch" forName="quad2" refType="h" fact="0.29"/>
-          <dgm:constr type="w" for="ch" forName="quad3" refType="w" fact="0.39"/>
-          <dgm:constr type="h" for="ch" forName="quad3" refType="h" fact="0.39"/>
-          <dgm:constr type="ctrX" for="ch" forName="quad3" refType="w" fact="0.71"/>
-          <dgm:constr type="ctrY" for="ch" forName="quad3" refType="h" fact="0.71"/>
-          <dgm:constr type="w" for="ch" forName="quad4" refType="w" fact="0.39"/>
-          <dgm:constr type="h" for="ch" forName="quad4" refType="h" fact="0.39"/>
-          <dgm:constr type="ctrX" for="ch" forName="quad4" refType="w" fact="0.29"/>
-          <dgm:constr type="ctrY" for="ch" forName="quad4" refType="h" fact="0.71"/>
-          <dgm:constr type="primFontSz" for="des" ptType="node" op="equ" val="65"/>
-        </dgm:constrLst>
-      </dgm:else>
-    </dgm:choose>
-    <dgm:ruleLst/>
-    <dgm:choose name="Name3">
-      <dgm:if name="Name4" axis="ch" ptType="node" func="cnt" op="gte" val="1">
-        <dgm:layoutNode name="diamond" styleLbl="bgShp">
-          <dgm:alg type="sp"/>
-          <dgm:shape xmlns:r="http://schemas.openxmlformats.org/officeDocument/2006/relationships" type="diamond" r:blip="">
-            <dgm:adjLst/>
-          </dgm:shape>
-          <dgm:presOf/>
-          <dgm:constrLst>
-            <dgm:constr type="w" refType="h" op="equ"/>
-          </dgm:constrLst>
-          <dgm:ruleLst/>
-        </dgm:layoutNode>
-        <dgm:layoutNode name="quad1">
-          <dgm:varLst>
-            <dgm:chMax val="0"/>
-            <dgm:chPref val="0"/>
-            <dgm:bulletEnabled val="1"/>
-          </dgm:varLst>
-          <dgm:alg type="tx"/>
-          <dgm:shape xmlns:r="http://schemas.openxmlformats.org/officeDocument/2006/relationships" type="roundRect" r:blip="">
-            <dgm:adjLst/>
-          </dgm:shape>
-          <dgm:presOf axis="ch desOrSelf" ptType="node node" st="1 1" cnt="1 0"/>
-          <dgm:constrLst>
-            <dgm:constr type="w" refType="h" op="equ"/>
-            <dgm:constr type="tMarg" refType="primFontSz" fact="0.3"/>
-            <dgm:constr type="bMarg" refType="primFontSz" fact="0.3"/>
-            <dgm:constr type="lMarg" refType="primFontSz" fact="0.3"/>
-            <dgm:constr type="rMarg" refType="primFontSz" fact="0.3"/>
-          </dgm:constrLst>
-          <dgm:ruleLst>
-            <dgm:rule type="primFontSz" val="5" fact="NaN" max="NaN"/>
-          </dgm:ruleLst>
-        </dgm:layoutNode>
-        <dgm:layoutNode name="quad2">
-          <dgm:varLst>
-            <dgm:chMax val="0"/>
-            <dgm:chPref val="0"/>
-            <dgm:bulletEnabled val="1"/>
-          </dgm:varLst>
-          <dgm:alg type="tx"/>
-          <dgm:shape xmlns:r="http://schemas.openxmlformats.org/officeDocument/2006/relationships" type="roundRect" r:blip="">
-            <dgm:adjLst/>
-          </dgm:shape>
-          <dgm:presOf axis="ch desOrSelf" ptType="node node" st="2 1" cnt="1 0"/>
-          <dgm:constrLst>
-            <dgm:constr type="w" refType="h" op="equ"/>
-            <dgm:constr type="tMarg" refType="primFontSz" fact="0.3"/>
-            <dgm:constr type="bMarg" refType="primFontSz" fact="0.3"/>
-            <dgm:constr type="lMarg" refType="primFontSz" fact="0.3"/>
-            <dgm:constr type="rMarg" refType="primFontSz" fact="0.3"/>
-          </dgm:constrLst>
-          <dgm:ruleLst>
-            <dgm:rule type="primFontSz" val="5" fact="NaN" max="NaN"/>
-          </dgm:ruleLst>
-        </dgm:layoutNode>
-        <dgm:layoutNode name="quad3">
-          <dgm:varLst>
-            <dgm:chMax val="0"/>
-            <dgm:chPref val="0"/>
-            <dgm:bulletEnabled val="1"/>
-          </dgm:varLst>
-          <dgm:alg type="tx"/>
-          <dgm:shape xmlns:r="http://schemas.openxmlformats.org/officeDocument/2006/relationships" type="roundRect" r:blip="">
-            <dgm:adjLst/>
-          </dgm:shape>
-          <dgm:presOf axis="ch desOrSelf" ptType="node node" st="3 1" cnt="1 0"/>
-          <dgm:constrLst>
-            <dgm:constr type="w" refType="h" op="equ"/>
-            <dgm:constr type="tMarg" refType="primFontSz" fact="0.3"/>
-            <dgm:constr type="bMarg" refType="primFontSz" fact="0.3"/>
-            <dgm:constr type="lMarg" refType="primFontSz" fact="0.3"/>
-            <dgm:constr type="rMarg" refType="primFontSz" fact="0.3"/>
-          </dgm:constrLst>
-          <dgm:ruleLst>
-            <dgm:rule type="primFontSz" val="5" fact="NaN" max="NaN"/>
-          </dgm:ruleLst>
-        </dgm:layoutNode>
-        <dgm:layoutNode name="quad4">
-          <dgm:varLst>
-            <dgm:chMax val="0"/>
-            <dgm:chPref val="0"/>
-            <dgm:bulletEnabled val="1"/>
-          </dgm:varLst>
-          <dgm:alg type="tx"/>
-          <dgm:shape xmlns:r="http://schemas.openxmlformats.org/officeDocument/2006/relationships" type="roundRect" r:blip="">
-            <dgm:adjLst/>
-          </dgm:shape>
-          <dgm:presOf axis="ch desOrSelf" ptType="node node" st="4 1" cnt="1 0"/>
-          <dgm:constrLst>
-            <dgm:constr type="w" refType="h" op="equ"/>
-            <dgm:constr type="tMarg" refType="primFontSz" fact="0.3"/>
-            <dgm:constr type="bMarg" refType="primFontSz" fact="0.3"/>
-            <dgm:constr type="lMarg" refType="primFontSz" fact="0.3"/>
-            <dgm:constr type="rMarg" refType="primFontSz" fact="0.3"/>
-          </dgm:constrLst>
-          <dgm:ruleLst>
-            <dgm:rule type="primFontSz" val="5" fact="NaN" max="NaN"/>
-          </dgm:ruleLst>
-        </dgm:layoutNode>
-      </dgm:if>
-      <dgm:else name="Name5"/>
-    </dgm:choose>
+        <dgm:ruleLst>
+          <dgm:rule type="h" val="INF" fact="NaN" max="NaN"/>
+        </dgm:ruleLst>
+      </dgm:layoutNode>
+      <dgm:choose name="Name1">
+        <dgm:if name="Name2" axis="ch" ptType="node" func="cnt" op="gte" val="1">
+          <dgm:layoutNode name="childText" styleLbl="revTx">
+            <dgm:varLst>
+              <dgm:bulletEnabled val="1"/>
+            </dgm:varLst>
+            <dgm:alg type="tx">
+              <dgm:param type="stBulletLvl" val="1"/>
+              <dgm:param type="lnSpAfChP" val="20"/>
+            </dgm:alg>
+            <dgm:shape xmlns:r="http://schemas.openxmlformats.org/officeDocument/2006/relationships" type="rect" r:blip="">
+              <dgm:adjLst/>
+            </dgm:shape>
+            <dgm:presOf axis="des" ptType="node"/>
+            <dgm:constrLst>
+              <dgm:constr type="tMarg" refType="primFontSz" fact="0.1"/>
+              <dgm:constr type="bMarg" refType="primFontSz" fact="0.1"/>
+              <dgm:constr type="lMarg" refType="w" fact="0.09"/>
+            </dgm:constrLst>
+            <dgm:ruleLst>
+              <dgm:rule type="h" val="INF" fact="NaN" max="NaN"/>
+            </dgm:ruleLst>
+          </dgm:layoutNode>
+        </dgm:if>
+        <dgm:else name="Name3">
+          <dgm:choose name="Name4">
+            <dgm:if name="Name5" axis="par ch" ptType="doc node" func="cnt" op="gte" val="2">
+              <dgm:forEach name="Name6" axis="followSib" ptType="sibTrans" cnt="1">
+                <dgm:layoutNode name="spacer">
+                  <dgm:alg type="sp"/>
+                  <dgm:shape xmlns:r="http://schemas.openxmlformats.org/officeDocument/2006/relationships" r:blip="">
+                    <dgm:adjLst/>
+                  </dgm:shape>
+                  <dgm:presOf/>
+                  <dgm:constrLst/>
+                  <dgm:ruleLst/>
+                </dgm:layoutNode>
+              </dgm:forEach>
+            </dgm:if>
+            <dgm:else name="Name7"/>
+          </dgm:choose>
+        </dgm:else>
+      </dgm:choose>
+    </dgm:forEach>
   </dgm:layoutNode>
 </dgm:layoutDef>
 </file>
@@ -18685,7 +18345,7 @@
           <a:p>
             <a:fld id="{2C6F5E1F-DB80-444E-9AD9-8F2AEEE53799}" type="datetimeFigureOut">
               <a:rPr lang="en-US" smtClean="0"/>
-              <a:t>12/9/25</a:t>
+              <a:t>12/10/25</a:t>
             </a:fld>
             <a:endParaRPr lang="en-US"/>
           </a:p>
@@ -19312,33 +18972,6 @@
               <a:rPr lang="en-US" dirty="0"/>
               <a:t>Gave me some ideas on what I can implement which sparked something in me to pursue this</a:t>
             </a:r>
-          </a:p>
-          <a:p>
-            <a:pPr marL="171450" lvl="0" indent="-171450">
-              <a:buFont typeface="Arial" panose="020B0604020202020204" pitchFamily="34" charset="0"/>
-              <a:buChar char="•"/>
-            </a:pPr>
-            <a:r>
-              <a:rPr lang="en-US" dirty="0"/>
-              <a:t>ChatGPT</a:t>
-            </a:r>
-          </a:p>
-          <a:p>
-            <a:pPr marL="628650" lvl="1" indent="-171450">
-              <a:buFont typeface="Arial" panose="020B0604020202020204" pitchFamily="34" charset="0"/>
-              <a:buChar char="•"/>
-            </a:pPr>
-            <a:r>
-              <a:rPr lang="en-US" dirty="0"/>
-              <a:t>Briefly mentioned the idea to get its thoughts in terms of additional ideas to implement and viability/complexity of what can be achieved in less than ~2months</a:t>
-            </a:r>
-          </a:p>
-          <a:p>
-            <a:pPr marL="628650" lvl="1" indent="-171450">
-              <a:buFont typeface="Arial" panose="020B0604020202020204" pitchFamily="34" charset="0"/>
-              <a:buChar char="•"/>
-            </a:pPr>
-            <a:endParaRPr lang="en-US" dirty="0"/>
           </a:p>
         </p:txBody>
       </p:sp>
@@ -20019,33 +19652,7 @@
             </a:r>
           </a:p>
           <a:p>
-            <a:pPr marL="628650" lvl="1" indent="-171450">
-              <a:buFont typeface="Arial" panose="020B0604020202020204" pitchFamily="34" charset="0"/>
-              <a:buChar char="•"/>
-            </a:pPr>
-            <a:r>
-              <a:rPr lang="en-US" dirty="0"/>
-              <a:t>Message to </a:t>
-            </a:r>
-            <a:r>
-              <a:rPr lang="en-US" dirty="0" err="1"/>
-              <a:t>Ubidots</a:t>
-            </a:r>
-            <a:r>
-              <a:rPr lang="en-US" dirty="0"/>
-              <a:t> through </a:t>
-            </a:r>
-            <a:r>
-              <a:rPr lang="en-US" dirty="0" err="1"/>
-              <a:t>Mqtt</a:t>
-            </a:r>
-            <a:r>
-              <a:rPr lang="en-US" dirty="0"/>
-              <a:t> with no Wi-Fi on Arduino</a:t>
-            </a:r>
-          </a:p>
-          <a:p>
-            <a:pPr marL="171450" indent="-171450">
+            <a:pPr marL="171450" lvl="0" indent="-171450">
               <a:buFont typeface="Arial" panose="020B0604020202020204" pitchFamily="34" charset="0"/>
               <a:buChar char="•"/>
             </a:pPr>
@@ -20110,71 +19717,6 @@
             <a:r>
               <a:rPr lang="en-US" dirty="0"/>
               <a:t>Slight hiccups uploading data using phone</a:t>
-            </a:r>
-          </a:p>
-          <a:p>
-            <a:pPr marL="628650" lvl="1" indent="-171450">
-              <a:buFont typeface="Arial" panose="020B0604020202020204" pitchFamily="34" charset="0"/>
-              <a:buChar char="•"/>
-            </a:pPr>
-            <a:r>
-              <a:rPr lang="en-US" dirty="0"/>
-              <a:t>1s recording window length in model</a:t>
-            </a:r>
-          </a:p>
-          <a:p>
-            <a:pPr marL="171450" indent="-171450">
-              <a:buFont typeface="Arial" panose="020B0604020202020204" pitchFamily="34" charset="0"/>
-              <a:buChar char="•"/>
-            </a:pPr>
-            <a:r>
-              <a:rPr lang="en-US" dirty="0"/>
-              <a:t>Redesign ideas with more time</a:t>
-            </a:r>
-          </a:p>
-          <a:p>
-            <a:pPr marL="628650" lvl="1" indent="-171450">
-              <a:buFont typeface="Arial" panose="020B0604020202020204" pitchFamily="34" charset="0"/>
-              <a:buChar char="•"/>
-            </a:pPr>
-            <a:r>
-              <a:rPr lang="en-US" dirty="0"/>
-              <a:t>Wi-Fi module to remove GDA dependency</a:t>
-            </a:r>
-          </a:p>
-          <a:p>
-            <a:pPr marL="628650" lvl="1" indent="-171450">
-              <a:buFont typeface="Arial" panose="020B0604020202020204" pitchFamily="34" charset="0"/>
-              <a:buChar char="•"/>
-            </a:pPr>
-            <a:r>
-              <a:rPr lang="en-US" dirty="0"/>
-              <a:t>Send text to phone in addition to publishing to </a:t>
-            </a:r>
-            <a:r>
-              <a:rPr lang="en-US" dirty="0" err="1"/>
-              <a:t>Ubidots</a:t>
-            </a:r>
-            <a:endParaRPr lang="en-US" dirty="0"/>
-          </a:p>
-          <a:p>
-            <a:pPr marL="628650" lvl="1" indent="-171450">
-              <a:buFont typeface="Arial" panose="020B0604020202020204" pitchFamily="34" charset="0"/>
-              <a:buChar char="•"/>
-            </a:pPr>
-            <a:r>
-              <a:rPr lang="en-US" dirty="0"/>
-              <a:t>Camera for basic facial recognition</a:t>
-            </a:r>
-          </a:p>
-          <a:p>
-            <a:pPr marL="628650" lvl="1" indent="-171450">
-              <a:buFont typeface="Arial" panose="020B0604020202020204" pitchFamily="34" charset="0"/>
-              <a:buChar char="•"/>
-            </a:pPr>
-            <a:r>
-              <a:rPr lang="en-US" dirty="0"/>
-              <a:t>Speaker to output sounds based on correct/incorrect keyword (or maybe not to keep the device hidden?)</a:t>
             </a:r>
           </a:p>
           <a:p>
@@ -20553,7 +20095,7 @@
           <a:p>
             <a:fld id="{02AC24A9-CCB6-4F8D-B8DB-C2F3692CFA5A}" type="datetimeFigureOut">
               <a:rPr lang="en-US" smtClean="0"/>
-              <a:t>12/9/25</a:t>
+              <a:t>12/10/25</a:t>
             </a:fld>
             <a:endParaRPr lang="en-US" dirty="0"/>
           </a:p>
@@ -20923,7 +20465,7 @@
           <a:p>
             <a:fld id="{02AC24A9-CCB6-4F8D-B8DB-C2F3692CFA5A}" type="datetimeFigureOut">
               <a:rPr lang="en-US" smtClean="0"/>
-              <a:t>12/9/25</a:t>
+              <a:t>12/10/25</a:t>
             </a:fld>
             <a:endParaRPr lang="en-US"/>
           </a:p>
@@ -21132,7 +20674,7 @@
           <a:p>
             <a:fld id="{02AC24A9-CCB6-4F8D-B8DB-C2F3692CFA5A}" type="datetimeFigureOut">
               <a:rPr lang="en-US" smtClean="0"/>
-              <a:t>12/9/25</a:t>
+              <a:t>12/10/25</a:t>
             </a:fld>
             <a:endParaRPr lang="en-US"/>
           </a:p>
@@ -21602,7 +21144,7 @@
           <a:p>
             <a:fld id="{02AC24A9-CCB6-4F8D-B8DB-C2F3692CFA5A}" type="datetimeFigureOut">
               <a:rPr lang="en-US" smtClean="0"/>
-              <a:t>12/9/25</a:t>
+              <a:t>12/10/25</a:t>
             </a:fld>
             <a:endParaRPr lang="en-US"/>
           </a:p>
@@ -22056,7 +21598,7 @@
           <a:p>
             <a:fld id="{02AC24A9-CCB6-4F8D-B8DB-C2F3692CFA5A}" type="datetimeFigureOut">
               <a:rPr lang="en-US" smtClean="0"/>
-              <a:t>12/9/25</a:t>
+              <a:t>12/10/25</a:t>
             </a:fld>
             <a:endParaRPr lang="en-US"/>
           </a:p>
@@ -22588,7 +22130,7 @@
           <a:p>
             <a:fld id="{02AC24A9-CCB6-4F8D-B8DB-C2F3692CFA5A}" type="datetimeFigureOut">
               <a:rPr lang="en-US" smtClean="0"/>
-              <a:t>12/9/25</a:t>
+              <a:t>12/10/25</a:t>
             </a:fld>
             <a:endParaRPr lang="en-US"/>
           </a:p>
@@ -23287,7 +22829,7 @@
           <a:p>
             <a:fld id="{02AC24A9-CCB6-4F8D-B8DB-C2F3692CFA5A}" type="datetimeFigureOut">
               <a:rPr lang="en-US" smtClean="0"/>
-              <a:t>12/9/25</a:t>
+              <a:t>12/10/25</a:t>
             </a:fld>
             <a:endParaRPr lang="en-US"/>
           </a:p>
@@ -23616,7 +23158,7 @@
           <a:p>
             <a:fld id="{02AC24A9-CCB6-4F8D-B8DB-C2F3692CFA5A}" type="datetimeFigureOut">
               <a:rPr lang="en-US" smtClean="0"/>
-              <a:t>12/9/25</a:t>
+              <a:t>12/10/25</a:t>
             </a:fld>
             <a:endParaRPr lang="en-US"/>
           </a:p>
@@ -23729,7 +23271,7 @@
           <a:p>
             <a:fld id="{02AC24A9-CCB6-4F8D-B8DB-C2F3692CFA5A}" type="datetimeFigureOut">
               <a:rPr lang="en-US" smtClean="0"/>
-              <a:t>12/9/25</a:t>
+              <a:t>12/10/25</a:t>
             </a:fld>
             <a:endParaRPr lang="en-US"/>
           </a:p>
@@ -24224,7 +23766,7 @@
           <a:p>
             <a:fld id="{02AC24A9-CCB6-4F8D-B8DB-C2F3692CFA5A}" type="datetimeFigureOut">
               <a:rPr lang="en-US" smtClean="0"/>
-              <a:t>12/9/25</a:t>
+              <a:t>12/10/25</a:t>
             </a:fld>
             <a:endParaRPr lang="en-US" dirty="0"/>
           </a:p>
@@ -24701,7 +24243,7 @@
           <a:p>
             <a:fld id="{02AC24A9-CCB6-4F8D-B8DB-C2F3692CFA5A}" type="datetimeFigureOut">
               <a:rPr lang="en-US" smtClean="0"/>
-              <a:t>12/9/25</a:t>
+              <a:t>12/10/25</a:t>
             </a:fld>
             <a:endParaRPr lang="en-US"/>
           </a:p>
@@ -24944,7 +24486,7 @@
           <a:p>
             <a:fld id="{02AC24A9-CCB6-4F8D-B8DB-C2F3692CFA5A}" type="datetimeFigureOut">
               <a:rPr lang="en-US" smtClean="0"/>
-              <a:t>12/9/25</a:t>
+              <a:t>12/10/25</a:t>
             </a:fld>
             <a:endParaRPr lang="en-US"/>
           </a:p>
@@ -29298,13 +28840,7 @@
           <a:p>
             <a:r>
               <a:rPr lang="en-US" sz="1800" dirty="0"/>
-              <a:t>Discussion with Uncle at the beginning of semester</a:t>
-            </a:r>
-          </a:p>
-          <a:p>
-            <a:r>
-              <a:rPr lang="en-US" sz="1800" dirty="0"/>
-              <a:t>ChatGPT ;)</a:t>
+              <a:t>Discussion with an Uncle</a:t>
             </a:r>
           </a:p>
         </p:txBody>
@@ -30481,10 +30017,10 @@
       </p:grpSpPr>
       <p:sp useBgFill="1">
         <p:nvSpPr>
-          <p:cNvPr id="6" name="Rectangle 5">
+          <p:cNvPr id="40" name="Rectangle 39">
             <a:extLst>
               <a:ext uri="{FF2B5EF4-FFF2-40B4-BE49-F238E27FC236}">
-                <a16:creationId xmlns:a16="http://schemas.microsoft.com/office/drawing/2014/main" id="{81E1224E-6618-482E-BE87-321A7FC1CDE8}"/>
+                <a16:creationId xmlns:a16="http://schemas.microsoft.com/office/drawing/2014/main" id="{B5416EBC-B41E-4F8A-BE9F-07301B682CBD}"/>
               </a:ext>
               <a:ext uri="{C183D7F6-B498-43B3-948B-1728B52AA6E4}">
                 <adec:decorative xmlns:adec="http://schemas.microsoft.com/office/drawing/2017/decorative" val="1"/>
@@ -30539,48 +30075,12 @@
           </a:p>
         </p:txBody>
       </p:sp>
-      <p:sp>
+      <p:sp useBgFill="1">
         <p:nvSpPr>
-          <p:cNvPr id="2" name="Title 1">
+          <p:cNvPr id="41" name="Rectangle 40">
             <a:extLst>
               <a:ext uri="{FF2B5EF4-FFF2-40B4-BE49-F238E27FC236}">
-                <a16:creationId xmlns:a16="http://schemas.microsoft.com/office/drawing/2014/main" id="{CEAC5117-F9A2-7226-5CA4-B4B813569790}"/>
-              </a:ext>
-            </a:extLst>
-          </p:cNvPr>
-          <p:cNvSpPr>
-            <a:spLocks noGrp="1"/>
-          </p:cNvSpPr>
-          <p:nvPr>
-            <p:ph type="title"/>
-          </p:nvPr>
-        </p:nvSpPr>
-        <p:spPr>
-          <a:xfrm>
-            <a:off x="659234" y="957447"/>
-            <a:ext cx="3383280" cy="4943105"/>
-          </a:xfrm>
-        </p:spPr>
-        <p:txBody>
-          <a:bodyPr anchor="ctr">
-            <a:normAutofit/>
-          </a:bodyPr>
-          <a:lstStyle/>
-          <a:p>
-            <a:r>
-              <a:rPr lang="en-US"/>
-              <a:t>Reflection</a:t>
-            </a:r>
-            <a:endParaRPr lang="en-US" dirty="0"/>
-          </a:p>
-        </p:txBody>
-      </p:sp>
-      <p:sp>
-        <p:nvSpPr>
-          <p:cNvPr id="18" name="Rectangle 17">
-            <a:extLst>
-              <a:ext uri="{FF2B5EF4-FFF2-40B4-BE49-F238E27FC236}">
-                <a16:creationId xmlns:a16="http://schemas.microsoft.com/office/drawing/2014/main" id="{066346BE-FDB4-4772-A696-0719490ABD64}"/>
+                <a16:creationId xmlns:a16="http://schemas.microsoft.com/office/drawing/2014/main" id="{AFF79527-C7F1-4E06-8126-A8E8C5FEBFCA}"/>
               </a:ext>
               <a:ext uri="{C183D7F6-B498-43B3-948B-1728B52AA6E4}">
                 <adec:decorative xmlns:adec="http://schemas.microsoft.com/office/drawing/2017/decorative" val="1"/>
@@ -30599,19 +30099,29 @@
           </p:nvPr>
         </p:nvSpPr>
         <p:spPr>
-          <a:xfrm rot="5400000">
-            <a:off x="938126" y="346791"/>
-            <a:ext cx="146304" cy="704088"/>
+          <a:xfrm>
+            <a:off x="558210" y="1162033"/>
+            <a:ext cx="3740740" cy="4643344"/>
           </a:xfrm>
           <a:prstGeom prst="rect">
             <a:avLst/>
           </a:prstGeom>
-          <a:solidFill>
-            <a:schemeClr val="accent1"/>
-          </a:solidFill>
-          <a:ln>
-            <a:noFill/>
+          <a:ln w="12700">
+            <a:solidFill>
+              <a:schemeClr val="tx2">
+                <a:lumMod val="10000"/>
+                <a:lumOff val="90000"/>
+              </a:schemeClr>
+            </a:solidFill>
           </a:ln>
+          <a:effectLst>
+            <a:outerShdw blurRad="50800" dist="38100" dir="2700000" algn="tl" rotWithShape="0">
+              <a:schemeClr val="bg1">
+                <a:lumMod val="85000"/>
+                <a:alpha val="30000"/>
+              </a:schemeClr>
+            </a:outerShdw>
+          </a:effectLst>
         </p:spPr>
         <p:style>
           <a:lnRef idx="2">
@@ -30669,10 +30179,45 @@
       </p:sp>
       <p:sp>
         <p:nvSpPr>
-          <p:cNvPr id="23" name="Rectangle 22">
+          <p:cNvPr id="2" name="Title 1">
             <a:extLst>
               <a:ext uri="{FF2B5EF4-FFF2-40B4-BE49-F238E27FC236}">
-                <a16:creationId xmlns:a16="http://schemas.microsoft.com/office/drawing/2014/main" id="{FB92FFCE-0C90-454E-AA25-D4EE9A6C39C5}"/>
+                <a16:creationId xmlns:a16="http://schemas.microsoft.com/office/drawing/2014/main" id="{CEAC5117-F9A2-7226-5CA4-B4B813569790}"/>
+              </a:ext>
+            </a:extLst>
+          </p:cNvPr>
+          <p:cNvSpPr>
+            <a:spLocks noGrp="1"/>
+          </p:cNvSpPr>
+          <p:nvPr>
+            <p:ph type="title"/>
+          </p:nvPr>
+        </p:nvSpPr>
+        <p:spPr>
+          <a:xfrm>
+            <a:off x="868680" y="1719072"/>
+            <a:ext cx="3103427" cy="3520440"/>
+          </a:xfrm>
+        </p:spPr>
+        <p:txBody>
+          <a:bodyPr anchor="t">
+            <a:normAutofit/>
+          </a:bodyPr>
+          <a:lstStyle/>
+          <a:p>
+            <a:r>
+              <a:rPr lang="en-US" sz="3600"/>
+              <a:t>Reflection</a:t>
+            </a:r>
+          </a:p>
+        </p:txBody>
+      </p:sp>
+      <p:sp>
+        <p:nvSpPr>
+          <p:cNvPr id="42" name="Rectangle 41">
+            <a:extLst>
+              <a:ext uri="{FF2B5EF4-FFF2-40B4-BE49-F238E27FC236}">
+                <a16:creationId xmlns:a16="http://schemas.microsoft.com/office/drawing/2014/main" id="{55986208-8A53-4E92-9197-6B57BCCB2F37}"/>
               </a:ext>
               <a:ext uri="{C183D7F6-B498-43B3-948B-1728B52AA6E4}">
                 <adec:decorative xmlns:adec="http://schemas.microsoft.com/office/drawing/2017/decorative" val="1"/>
@@ -30692,22 +30237,18 @@
         </p:nvSpPr>
         <p:spPr>
           <a:xfrm>
-            <a:off x="659234" y="6163056"/>
-            <a:ext cx="3383280" cy="18288"/>
+            <a:off x="498834" y="1618375"/>
+            <a:ext cx="146304" cy="822960"/>
           </a:xfrm>
           <a:prstGeom prst="rect">
             <a:avLst/>
           </a:prstGeom>
           <a:solidFill>
-            <a:schemeClr val="tx2">
-              <a:lumMod val="25000"/>
-              <a:lumOff val="75000"/>
-            </a:schemeClr>
+            <a:schemeClr val="accent1"/>
           </a:solidFill>
-          <a:ln w="3175">
+          <a:ln>
             <a:noFill/>
           </a:ln>
-          <a:effectLst/>
         </p:spPr>
         <p:style>
           <a:lnRef idx="2">
@@ -30779,14 +30320,14 @@
             <p:ph idx="1"/>
             <p:extLst>
               <p:ext uri="{D42A27DB-BD31-4B8C-83A1-F6EECF244321}">
-                <p14:modId xmlns:p14="http://schemas.microsoft.com/office/powerpoint/2010/main" val="1995713191"/>
+                <p14:modId xmlns:p14="http://schemas.microsoft.com/office/powerpoint/2010/main" val="3178510681"/>
               </p:ext>
             </p:extLst>
           </p:nvPr>
         </p:nvGraphicFramePr>
         <p:xfrm>
-          <a:off x="4553712" y="621792"/>
-          <a:ext cx="6812280" cy="5541264"/>
+          <a:off x="4727448" y="640080"/>
+          <a:ext cx="6967728" cy="5577840"/>
         </p:xfrm>
         <a:graphic>
           <a:graphicData uri="http://schemas.openxmlformats.org/drawingml/2006/diagram">

</xml_diff>